<commit_message>
pj1 unit2, interface,abstract class, exception handler
</commit_message>
<xml_diff>
--- a/Project1/pj1Design.pptx
+++ b/Project1/pj1Design.pptx
@@ -6,6 +6,11 @@
   </p:sldMasterIdLst>
   <p:sldIdLst>
     <p:sldId id="256" r:id="rId2"/>
+    <p:sldId id="258" r:id="rId3"/>
+    <p:sldId id="259" r:id="rId4"/>
+    <p:sldId id="260" r:id="rId5"/>
+    <p:sldId id="261" r:id="rId6"/>
+    <p:sldId id="257" r:id="rId7"/>
   </p:sldIdLst>
   <p:sldSz cx="9144000" cy="6858000" type="screen4x3"/>
   <p:notesSz cx="6858000" cy="9144000"/>
@@ -288,7 +293,7 @@
           <a:p>
             <a:fld id="{098793E4-7573-154F-9646-0BCE3A072887}" type="datetimeFigureOut">
               <a:rPr lang="en-US" smtClean="0"/>
-              <a:t>9/24/12</a:t>
+              <a:t>10/3/12</a:t>
             </a:fld>
             <a:endParaRPr lang="en-US"/>
           </a:p>
@@ -458,7 +463,7 @@
           <a:p>
             <a:fld id="{098793E4-7573-154F-9646-0BCE3A072887}" type="datetimeFigureOut">
               <a:rPr lang="en-US" smtClean="0"/>
-              <a:t>9/24/12</a:t>
+              <a:t>10/3/12</a:t>
             </a:fld>
             <a:endParaRPr lang="en-US"/>
           </a:p>
@@ -638,7 +643,7 @@
           <a:p>
             <a:fld id="{098793E4-7573-154F-9646-0BCE3A072887}" type="datetimeFigureOut">
               <a:rPr lang="en-US" smtClean="0"/>
-              <a:t>9/24/12</a:t>
+              <a:t>10/3/12</a:t>
             </a:fld>
             <a:endParaRPr lang="en-US"/>
           </a:p>
@@ -808,7 +813,7 @@
           <a:p>
             <a:fld id="{098793E4-7573-154F-9646-0BCE3A072887}" type="datetimeFigureOut">
               <a:rPr lang="en-US" smtClean="0"/>
-              <a:t>9/24/12</a:t>
+              <a:t>10/3/12</a:t>
             </a:fld>
             <a:endParaRPr lang="en-US"/>
           </a:p>
@@ -1054,7 +1059,7 @@
           <a:p>
             <a:fld id="{098793E4-7573-154F-9646-0BCE3A072887}" type="datetimeFigureOut">
               <a:rPr lang="en-US" smtClean="0"/>
-              <a:t>9/24/12</a:t>
+              <a:t>10/3/12</a:t>
             </a:fld>
             <a:endParaRPr lang="en-US"/>
           </a:p>
@@ -1342,7 +1347,7 @@
           <a:p>
             <a:fld id="{098793E4-7573-154F-9646-0BCE3A072887}" type="datetimeFigureOut">
               <a:rPr lang="en-US" smtClean="0"/>
-              <a:t>9/24/12</a:t>
+              <a:t>10/3/12</a:t>
             </a:fld>
             <a:endParaRPr lang="en-US"/>
           </a:p>
@@ -1764,7 +1769,7 @@
           <a:p>
             <a:fld id="{098793E4-7573-154F-9646-0BCE3A072887}" type="datetimeFigureOut">
               <a:rPr lang="en-US" smtClean="0"/>
-              <a:t>9/24/12</a:t>
+              <a:t>10/3/12</a:t>
             </a:fld>
             <a:endParaRPr lang="en-US"/>
           </a:p>
@@ -1882,7 +1887,7 @@
           <a:p>
             <a:fld id="{098793E4-7573-154F-9646-0BCE3A072887}" type="datetimeFigureOut">
               <a:rPr lang="en-US" smtClean="0"/>
-              <a:t>9/24/12</a:t>
+              <a:t>10/3/12</a:t>
             </a:fld>
             <a:endParaRPr lang="en-US"/>
           </a:p>
@@ -1977,7 +1982,7 @@
           <a:p>
             <a:fld id="{098793E4-7573-154F-9646-0BCE3A072887}" type="datetimeFigureOut">
               <a:rPr lang="en-US" smtClean="0"/>
-              <a:t>9/24/12</a:t>
+              <a:t>10/3/12</a:t>
             </a:fld>
             <a:endParaRPr lang="en-US"/>
           </a:p>
@@ -2254,7 +2259,7 @@
           <a:p>
             <a:fld id="{098793E4-7573-154F-9646-0BCE3A072887}" type="datetimeFigureOut">
               <a:rPr lang="en-US" smtClean="0"/>
-              <a:t>9/24/12</a:t>
+              <a:t>10/3/12</a:t>
             </a:fld>
             <a:endParaRPr lang="en-US"/>
           </a:p>
@@ -2507,7 +2512,7 @@
           <a:p>
             <a:fld id="{098793E4-7573-154F-9646-0BCE3A072887}" type="datetimeFigureOut">
               <a:rPr lang="en-US" smtClean="0"/>
-              <a:t>9/24/12</a:t>
+              <a:t>10/3/12</a:t>
             </a:fld>
             <a:endParaRPr lang="en-US"/>
           </a:p>
@@ -2720,7 +2725,7 @@
           <a:p>
             <a:fld id="{098793E4-7573-154F-9646-0BCE3A072887}" type="datetimeFigureOut">
               <a:rPr lang="en-US" smtClean="0"/>
-              <a:t>9/24/12</a:t>
+              <a:t>10/3/12</a:t>
             </a:fld>
             <a:endParaRPr lang="en-US"/>
           </a:p>
@@ -3103,8 +3108,8 @@
         </p:nvSpPr>
         <p:spPr>
           <a:xfrm>
-            <a:off x="167725" y="760100"/>
-            <a:ext cx="2324187" cy="1911809"/>
+            <a:off x="1126399" y="760101"/>
+            <a:ext cx="1066251" cy="369332"/>
           </a:xfrm>
           <a:prstGeom prst="rect">
             <a:avLst/>
@@ -3144,442 +3149,22 @@
                   <a:schemeClr val="tx1"/>
                 </a:solidFill>
               </a:rPr>
-              <a:t>	Option</a:t>
-            </a:r>
-          </a:p>
-          <a:p>
+              <a:t>	</a:t>
+            </a:r>
             <a:r>
               <a:rPr lang="en-US" sz="800" b="1" dirty="0" smtClean="0">
                 <a:solidFill>
                   <a:schemeClr val="tx1"/>
                 </a:solidFill>
               </a:rPr>
-              <a:t>Values 	</a:t>
-            </a:r>
-          </a:p>
-          <a:p>
-            <a:r>
-              <a:rPr lang="en-US" sz="800" b="1" dirty="0" smtClean="0">
-                <a:solidFill>
-                  <a:schemeClr val="tx1"/>
-                </a:solidFill>
-              </a:rPr>
-              <a:t>	private </a:t>
-            </a:r>
-            <a:r>
-              <a:rPr lang="en-US" sz="800" b="1" dirty="0">
-                <a:solidFill>
-                  <a:schemeClr val="tx1"/>
-                </a:solidFill>
-              </a:rPr>
-              <a:t>static final long </a:t>
-            </a:r>
-            <a:r>
-              <a:rPr lang="en-US" sz="800" b="1" i="1" dirty="0" err="1" smtClean="0">
-                <a:solidFill>
-                  <a:schemeClr val="tx1"/>
-                </a:solidFill>
-              </a:rPr>
-              <a:t>serialVersionUID</a:t>
-            </a:r>
-            <a:endParaRPr lang="en-US" sz="800" b="1" i="1" dirty="0">
-              <a:solidFill>
-                <a:schemeClr val="tx1"/>
-              </a:solidFill>
-            </a:endParaRPr>
-          </a:p>
-          <a:p>
-            <a:r>
-              <a:rPr lang="en-US" sz="800" b="1" dirty="0">
-                <a:solidFill>
-                  <a:schemeClr val="tx1"/>
-                </a:solidFill>
-              </a:rPr>
-              <a:t>	private String name;</a:t>
-            </a:r>
-          </a:p>
-          <a:p>
-            <a:r>
-              <a:rPr lang="en-US" sz="800" b="1" dirty="0">
-                <a:solidFill>
-                  <a:schemeClr val="tx1"/>
-                </a:solidFill>
-              </a:rPr>
-              <a:t>	private </a:t>
-            </a:r>
-            <a:r>
-              <a:rPr lang="en-US" sz="800" b="1" dirty="0" err="1">
-                <a:solidFill>
-                  <a:schemeClr val="tx1"/>
-                </a:solidFill>
-              </a:rPr>
-              <a:t>int</a:t>
-            </a:r>
-            <a:r>
-              <a:rPr lang="en-US" sz="800" b="1" dirty="0">
-                <a:solidFill>
-                  <a:schemeClr val="tx1"/>
-                </a:solidFill>
-              </a:rPr>
-              <a:t> price</a:t>
-            </a:r>
-            <a:r>
-              <a:rPr lang="en-US" sz="800" b="1" dirty="0" smtClean="0">
-                <a:solidFill>
-                  <a:schemeClr val="tx1"/>
-                </a:solidFill>
-              </a:rPr>
-              <a:t>;</a:t>
-            </a:r>
-            <a:r>
-              <a:rPr lang="en-US" sz="800" b="1" dirty="0">
-                <a:solidFill>
-                  <a:schemeClr val="tx1"/>
-                </a:solidFill>
-              </a:rPr>
-              <a:t>	</a:t>
-            </a:r>
-          </a:p>
-          <a:p>
+              <a:t>Option</a:t>
+            </a:r>
             <a:endParaRPr lang="en-US" sz="800" b="1" dirty="0" smtClean="0">
               <a:solidFill>
                 <a:schemeClr val="tx1"/>
               </a:solidFill>
             </a:endParaRPr>
           </a:p>
-          <a:p>
-            <a:r>
-              <a:rPr lang="en-US" sz="800" b="1" dirty="0" smtClean="0">
-                <a:solidFill>
-                  <a:schemeClr val="tx1"/>
-                </a:solidFill>
-              </a:rPr>
-              <a:t>Methods</a:t>
-            </a:r>
-          </a:p>
-          <a:p>
-            <a:r>
-              <a:rPr lang="en-US" sz="800" b="1" dirty="0" smtClean="0">
-                <a:solidFill>
-                  <a:schemeClr val="tx1"/>
-                </a:solidFill>
-              </a:rPr>
-              <a:t>	public </a:t>
-            </a:r>
-            <a:r>
-              <a:rPr lang="en-US" sz="800" b="1" dirty="0">
-                <a:solidFill>
-                  <a:schemeClr val="tx1"/>
-                </a:solidFill>
-              </a:rPr>
-              <a:t>Option(</a:t>
-            </a:r>
-            <a:r>
-              <a:rPr lang="en-US" sz="800" b="1" dirty="0" smtClean="0">
-                <a:solidFill>
-                  <a:schemeClr val="tx1"/>
-                </a:solidFill>
-              </a:rPr>
-              <a:t>)</a:t>
-            </a:r>
-            <a:endParaRPr lang="en-US" sz="800" b="1" dirty="0">
-              <a:solidFill>
-                <a:schemeClr val="tx1"/>
-              </a:solidFill>
-            </a:endParaRPr>
-          </a:p>
-          <a:p>
-            <a:r>
-              <a:rPr lang="en-US" sz="800" b="1" dirty="0">
-                <a:solidFill>
-                  <a:schemeClr val="tx1"/>
-                </a:solidFill>
-              </a:rPr>
-              <a:t>	public Option(String name, </a:t>
-            </a:r>
-            <a:r>
-              <a:rPr lang="en-US" sz="800" b="1" dirty="0" err="1">
-                <a:solidFill>
-                  <a:schemeClr val="tx1"/>
-                </a:solidFill>
-              </a:rPr>
-              <a:t>int</a:t>
-            </a:r>
-            <a:r>
-              <a:rPr lang="en-US" sz="800" b="1" dirty="0">
-                <a:solidFill>
-                  <a:schemeClr val="tx1"/>
-                </a:solidFill>
-              </a:rPr>
-              <a:t> </a:t>
-            </a:r>
-            <a:r>
-              <a:rPr lang="en-US" sz="800" b="1" dirty="0" smtClean="0">
-                <a:solidFill>
-                  <a:schemeClr val="tx1"/>
-                </a:solidFill>
-              </a:rPr>
-              <a:t>price)</a:t>
-            </a:r>
-            <a:endParaRPr lang="da-DK" sz="800" b="1" dirty="0">
-              <a:solidFill>
-                <a:schemeClr val="tx1"/>
-              </a:solidFill>
-            </a:endParaRPr>
-          </a:p>
-          <a:p>
-            <a:r>
-              <a:rPr lang="da-DK" sz="800" b="1" dirty="0">
-                <a:solidFill>
-                  <a:schemeClr val="tx1"/>
-                </a:solidFill>
-              </a:rPr>
-              <a:t>	public </a:t>
-            </a:r>
-            <a:r>
-              <a:rPr lang="da-DK" sz="800" b="1" dirty="0" err="1">
-                <a:solidFill>
-                  <a:schemeClr val="tx1"/>
-                </a:solidFill>
-              </a:rPr>
-              <a:t>String</a:t>
-            </a:r>
-            <a:r>
-              <a:rPr lang="da-DK" sz="800" b="1" dirty="0">
-                <a:solidFill>
-                  <a:schemeClr val="tx1"/>
-                </a:solidFill>
-              </a:rPr>
-              <a:t> </a:t>
-            </a:r>
-            <a:r>
-              <a:rPr lang="da-DK" sz="800" b="1" dirty="0" err="1">
-                <a:solidFill>
-                  <a:schemeClr val="tx1"/>
-                </a:solidFill>
-              </a:rPr>
-              <a:t>getName</a:t>
-            </a:r>
-            <a:r>
-              <a:rPr lang="da-DK" sz="800" b="1" dirty="0">
-                <a:solidFill>
-                  <a:schemeClr val="tx1"/>
-                </a:solidFill>
-              </a:rPr>
-              <a:t>() 	</a:t>
-            </a:r>
-          </a:p>
-          <a:p>
-            <a:r>
-              <a:rPr lang="da-DK" sz="800" b="1" dirty="0">
-                <a:solidFill>
-                  <a:schemeClr val="tx1"/>
-                </a:solidFill>
-              </a:rPr>
-              <a:t>	public </a:t>
-            </a:r>
-            <a:r>
-              <a:rPr lang="da-DK" sz="800" b="1" dirty="0" err="1">
-                <a:solidFill>
-                  <a:schemeClr val="tx1"/>
-                </a:solidFill>
-              </a:rPr>
-              <a:t>int</a:t>
-            </a:r>
-            <a:r>
-              <a:rPr lang="da-DK" sz="800" b="1" dirty="0">
-                <a:solidFill>
-                  <a:schemeClr val="tx1"/>
-                </a:solidFill>
-              </a:rPr>
-              <a:t> </a:t>
-            </a:r>
-            <a:r>
-              <a:rPr lang="da-DK" sz="800" b="1" dirty="0" err="1">
-                <a:solidFill>
-                  <a:schemeClr val="tx1"/>
-                </a:solidFill>
-              </a:rPr>
-              <a:t>getPrice</a:t>
-            </a:r>
-            <a:r>
-              <a:rPr lang="da-DK" sz="800" b="1" dirty="0">
-                <a:solidFill>
-                  <a:schemeClr val="tx1"/>
-                </a:solidFill>
-              </a:rPr>
-              <a:t>(</a:t>
-            </a:r>
-            <a:r>
-              <a:rPr lang="da-DK" sz="800" b="1" dirty="0" smtClean="0">
-                <a:solidFill>
-                  <a:schemeClr val="tx1"/>
-                </a:solidFill>
-              </a:rPr>
-              <a:t>)</a:t>
-            </a:r>
-          </a:p>
-          <a:p>
-            <a:r>
-              <a:rPr lang="da-DK" sz="800" b="1" dirty="0" smtClean="0">
-                <a:solidFill>
-                  <a:schemeClr val="tx1"/>
-                </a:solidFill>
-              </a:rPr>
-              <a:t> 	public </a:t>
-            </a:r>
-            <a:r>
-              <a:rPr lang="da-DK" sz="800" b="1" dirty="0" err="1" smtClean="0">
-                <a:solidFill>
-                  <a:schemeClr val="tx1"/>
-                </a:solidFill>
-              </a:rPr>
-              <a:t>void</a:t>
-            </a:r>
-            <a:r>
-              <a:rPr lang="da-DK" sz="800" b="1" dirty="0" smtClean="0">
-                <a:solidFill>
-                  <a:schemeClr val="tx1"/>
-                </a:solidFill>
-              </a:rPr>
-              <a:t> </a:t>
-            </a:r>
-            <a:r>
-              <a:rPr lang="da-DK" sz="800" b="1" dirty="0" err="1" smtClean="0">
-                <a:solidFill>
-                  <a:schemeClr val="tx1"/>
-                </a:solidFill>
-              </a:rPr>
-              <a:t>setName</a:t>
-            </a:r>
-            <a:r>
-              <a:rPr lang="da-DK" sz="800" b="1" dirty="0" smtClean="0">
-                <a:solidFill>
-                  <a:schemeClr val="tx1"/>
-                </a:solidFill>
-              </a:rPr>
-              <a:t>(</a:t>
-            </a:r>
-            <a:r>
-              <a:rPr lang="da-DK" sz="800" b="1" dirty="0" err="1" smtClean="0">
-                <a:solidFill>
-                  <a:schemeClr val="tx1"/>
-                </a:solidFill>
-              </a:rPr>
-              <a:t>String</a:t>
-            </a:r>
-            <a:r>
-              <a:rPr lang="da-DK" sz="800" b="1" dirty="0" smtClean="0">
-                <a:solidFill>
-                  <a:schemeClr val="tx1"/>
-                </a:solidFill>
-              </a:rPr>
-              <a:t> </a:t>
-            </a:r>
-            <a:r>
-              <a:rPr lang="da-DK" sz="800" b="1" dirty="0" err="1" smtClean="0">
-                <a:solidFill>
-                  <a:schemeClr val="tx1"/>
-                </a:solidFill>
-              </a:rPr>
-              <a:t>name</a:t>
-            </a:r>
-            <a:r>
-              <a:rPr lang="da-DK" sz="800" b="1" dirty="0" smtClean="0">
-                <a:solidFill>
-                  <a:schemeClr val="tx1"/>
-                </a:solidFill>
-              </a:rPr>
-              <a:t>)</a:t>
-            </a:r>
-            <a:r>
-              <a:rPr lang="da-DK" sz="800" b="1" dirty="0">
-                <a:solidFill>
-                  <a:schemeClr val="tx1"/>
-                </a:solidFill>
-              </a:rPr>
-              <a:t>	</a:t>
-            </a:r>
-          </a:p>
-          <a:p>
-            <a:r>
-              <a:rPr lang="da-DK" sz="800" b="1" dirty="0">
-                <a:solidFill>
-                  <a:schemeClr val="tx1"/>
-                </a:solidFill>
-              </a:rPr>
-              <a:t>	public </a:t>
-            </a:r>
-            <a:r>
-              <a:rPr lang="da-DK" sz="800" b="1" dirty="0" err="1">
-                <a:solidFill>
-                  <a:schemeClr val="tx1"/>
-                </a:solidFill>
-              </a:rPr>
-              <a:t>void</a:t>
-            </a:r>
-            <a:r>
-              <a:rPr lang="da-DK" sz="800" b="1" dirty="0">
-                <a:solidFill>
-                  <a:schemeClr val="tx1"/>
-                </a:solidFill>
-              </a:rPr>
-              <a:t> </a:t>
-            </a:r>
-            <a:r>
-              <a:rPr lang="da-DK" sz="800" b="1" dirty="0" err="1">
-                <a:solidFill>
-                  <a:schemeClr val="tx1"/>
-                </a:solidFill>
-              </a:rPr>
-              <a:t>setPrice</a:t>
-            </a:r>
-            <a:r>
-              <a:rPr lang="da-DK" sz="800" b="1" dirty="0">
-                <a:solidFill>
-                  <a:schemeClr val="tx1"/>
-                </a:solidFill>
-              </a:rPr>
-              <a:t>(</a:t>
-            </a:r>
-            <a:r>
-              <a:rPr lang="da-DK" sz="800" b="1" dirty="0" err="1">
-                <a:solidFill>
-                  <a:schemeClr val="tx1"/>
-                </a:solidFill>
-              </a:rPr>
-              <a:t>int</a:t>
-            </a:r>
-            <a:r>
-              <a:rPr lang="da-DK" sz="800" b="1" dirty="0">
-                <a:solidFill>
-                  <a:schemeClr val="tx1"/>
-                </a:solidFill>
-              </a:rPr>
-              <a:t> </a:t>
-            </a:r>
-            <a:r>
-              <a:rPr lang="da-DK" sz="800" b="1" dirty="0" err="1" smtClean="0">
-                <a:solidFill>
-                  <a:schemeClr val="tx1"/>
-                </a:solidFill>
-              </a:rPr>
-              <a:t>price</a:t>
-            </a:r>
-            <a:r>
-              <a:rPr lang="da-DK" sz="800" b="1" dirty="0" smtClean="0">
-                <a:solidFill>
-                  <a:schemeClr val="tx1"/>
-                </a:solidFill>
-              </a:rPr>
-              <a:t>)</a:t>
-            </a:r>
-            <a:endParaRPr lang="en-US" sz="800" b="1" dirty="0">
-              <a:solidFill>
-                <a:schemeClr val="tx1"/>
-              </a:solidFill>
-            </a:endParaRPr>
-          </a:p>
         </p:txBody>
       </p:sp>
       <p:sp>
@@ -3590,8 +3175,8 @@
         </p:nvSpPr>
         <p:spPr>
           <a:xfrm>
-            <a:off x="2729850" y="1994210"/>
-            <a:ext cx="2591096" cy="2510809"/>
+            <a:off x="2729850" y="3456389"/>
+            <a:ext cx="1295548" cy="422339"/>
           </a:xfrm>
           <a:prstGeom prst="rect">
             <a:avLst/>
@@ -3647,6 +3232,100 @@
               </a:solidFill>
             </a:endParaRPr>
           </a:p>
+        </p:txBody>
+      </p:sp>
+      <p:sp>
+        <p:nvSpPr>
+          <p:cNvPr id="7" name="Rectangle 6"/>
+          <p:cNvSpPr/>
+          <p:nvPr/>
+        </p:nvSpPr>
+        <p:spPr>
+          <a:xfrm>
+            <a:off x="3899602" y="256871"/>
+            <a:ext cx="1299869" cy="378158"/>
+          </a:xfrm>
+          <a:prstGeom prst="rect">
+            <a:avLst/>
+          </a:prstGeom>
+        </p:spPr>
+        <p:style>
+          <a:lnRef idx="1">
+            <a:schemeClr val="accent1"/>
+          </a:lnRef>
+          <a:fillRef idx="3">
+            <a:schemeClr val="accent1"/>
+          </a:fillRef>
+          <a:effectRef idx="2">
+            <a:schemeClr val="accent1"/>
+          </a:effectRef>
+          <a:fontRef idx="minor">
+            <a:schemeClr val="lt1"/>
+          </a:fontRef>
+        </p:style>
+        <p:txBody>
+          <a:bodyPr rtlCol="0" anchor="ctr"/>
+          <a:lstStyle/>
+          <a:p>
+            <a:r>
+              <a:rPr lang="en-US" sz="800" dirty="0" smtClean="0">
+                <a:solidFill>
+                  <a:srgbClr val="000000"/>
+                </a:solidFill>
+              </a:rPr>
+              <a:t>Interface</a:t>
+            </a:r>
+          </a:p>
+          <a:p>
+            <a:pPr algn="ctr"/>
+            <a:r>
+              <a:rPr lang="en-US" sz="800" dirty="0" err="1" smtClean="0">
+                <a:solidFill>
+                  <a:srgbClr val="000000"/>
+                </a:solidFill>
+              </a:rPr>
+              <a:t>Serializable</a:t>
+            </a:r>
+            <a:endParaRPr lang="en-US" sz="800" dirty="0">
+              <a:solidFill>
+                <a:srgbClr val="000000"/>
+              </a:solidFill>
+            </a:endParaRPr>
+          </a:p>
+        </p:txBody>
+      </p:sp>
+      <p:sp>
+        <p:nvSpPr>
+          <p:cNvPr id="8" name="Rectangle 7"/>
+          <p:cNvSpPr/>
+          <p:nvPr/>
+        </p:nvSpPr>
+        <p:spPr>
+          <a:xfrm>
+            <a:off x="6486610" y="2691015"/>
+            <a:ext cx="1341800" cy="424971"/>
+          </a:xfrm>
+          <a:prstGeom prst="rect">
+            <a:avLst/>
+          </a:prstGeom>
+        </p:spPr>
+        <p:style>
+          <a:lnRef idx="1">
+            <a:schemeClr val="accent1"/>
+          </a:lnRef>
+          <a:fillRef idx="3">
+            <a:schemeClr val="accent1"/>
+          </a:fillRef>
+          <a:effectRef idx="2">
+            <a:schemeClr val="accent1"/>
+          </a:effectRef>
+          <a:fontRef idx="minor">
+            <a:schemeClr val="lt1"/>
+          </a:fontRef>
+        </p:style>
+        <p:txBody>
+          <a:bodyPr rtlCol="0" anchor="ctr"/>
+          <a:lstStyle/>
           <a:p>
             <a:r>
               <a:rPr lang="en-US" sz="800" b="1" dirty="0" smtClean="0">
@@ -3654,97 +3333,7 @@
                   <a:srgbClr val="000000"/>
                 </a:solidFill>
               </a:rPr>
-              <a:t>Values 	</a:t>
-            </a:r>
-          </a:p>
-          <a:p>
-            <a:r>
-              <a:rPr lang="en-US" sz="800" b="1" dirty="0" smtClean="0">
-                <a:solidFill>
-                  <a:srgbClr val="000000"/>
-                </a:solidFill>
-              </a:rPr>
-              <a:t>	private </a:t>
-            </a:r>
-            <a:r>
-              <a:rPr lang="en-US" sz="800" b="1" dirty="0">
-                <a:solidFill>
-                  <a:srgbClr val="000000"/>
-                </a:solidFill>
-              </a:rPr>
-              <a:t>static final long </a:t>
-            </a:r>
-            <a:r>
-              <a:rPr lang="en-US" sz="800" b="1" i="1" dirty="0" err="1" smtClean="0">
-                <a:solidFill>
-                  <a:srgbClr val="000000"/>
-                </a:solidFill>
-              </a:rPr>
-              <a:t>serialVersionUID</a:t>
-            </a:r>
-            <a:endParaRPr lang="en-US" sz="800" b="1" i="1" dirty="0">
-              <a:solidFill>
-                <a:srgbClr val="000000"/>
-              </a:solidFill>
-            </a:endParaRPr>
-          </a:p>
-          <a:p>
-            <a:r>
-              <a:rPr lang="en-US" sz="800" b="1" dirty="0">
-                <a:solidFill>
-                  <a:srgbClr val="000000"/>
-                </a:solidFill>
-              </a:rPr>
-              <a:t>	private String name;</a:t>
-            </a:r>
-          </a:p>
-          <a:p>
-            <a:r>
-              <a:rPr lang="en-US" sz="800" dirty="0">
-                <a:solidFill>
-                  <a:srgbClr val="000000"/>
-                </a:solidFill>
-              </a:rPr>
-              <a:t>	</a:t>
-            </a:r>
-            <a:r>
-              <a:rPr lang="en-US" sz="800" b="1" dirty="0">
-                <a:solidFill>
-                  <a:srgbClr val="000000"/>
-                </a:solidFill>
-              </a:rPr>
-              <a:t>private </a:t>
-            </a:r>
-            <a:r>
-              <a:rPr lang="en-US" sz="800" b="1" dirty="0" err="1">
-                <a:solidFill>
-                  <a:srgbClr val="000000"/>
-                </a:solidFill>
-              </a:rPr>
-              <a:t>ArrayList</a:t>
-            </a:r>
-            <a:r>
-              <a:rPr lang="en-US" sz="800" b="1" dirty="0">
-                <a:solidFill>
-                  <a:srgbClr val="000000"/>
-                </a:solidFill>
-              </a:rPr>
-              <a:t>&lt;Option&gt; options;</a:t>
-            </a:r>
-            <a:endParaRPr lang="en-US" sz="800" b="1" dirty="0" smtClean="0">
-              <a:solidFill>
-                <a:srgbClr val="000000"/>
-              </a:solidFill>
-            </a:endParaRPr>
-          </a:p>
-          <a:p>
-            <a:r>
-              <a:rPr lang="en-US" sz="800" b="1" dirty="0" smtClean="0">
-                <a:solidFill>
-                  <a:srgbClr val="000000"/>
-                </a:solidFill>
-              </a:rPr>
-              <a:t>Methods</a:t>
+              <a:t>Class</a:t>
             </a:r>
           </a:p>
           <a:p>
@@ -3756,215 +3345,13 @@
               </a:rPr>
               <a:t>	</a:t>
             </a:r>
-            <a:endParaRPr lang="en-US" sz="800" dirty="0">
-              <a:solidFill>
-                <a:srgbClr val="000000"/>
-              </a:solidFill>
-            </a:endParaRPr>
-          </a:p>
-          <a:p>
-            <a:r>
-              <a:rPr lang="en-US" sz="800" dirty="0">
-                <a:solidFill>
-                  <a:srgbClr val="000000"/>
-                </a:solidFill>
-              </a:rPr>
-              <a:t>	</a:t>
-            </a:r>
-            <a:r>
-              <a:rPr lang="en-US" sz="800" b="1" dirty="0">
-                <a:solidFill>
-                  <a:srgbClr val="000000"/>
-                </a:solidFill>
-              </a:rPr>
-              <a:t>public </a:t>
-            </a:r>
-            <a:r>
-              <a:rPr lang="en-US" sz="800" b="1" dirty="0" err="1">
-                <a:solidFill>
-                  <a:srgbClr val="000000"/>
-                </a:solidFill>
-              </a:rPr>
-              <a:t>OptionSet</a:t>
-            </a:r>
-            <a:r>
-              <a:rPr lang="en-US" sz="800" b="1" dirty="0">
-                <a:solidFill>
-                  <a:srgbClr val="000000"/>
-                </a:solidFill>
-              </a:rPr>
-              <a:t>(</a:t>
-            </a:r>
             <a:r>
               <a:rPr lang="en-US" sz="800" b="1" dirty="0" smtClean="0">
                 <a:solidFill>
                   <a:srgbClr val="000000"/>
                 </a:solidFill>
               </a:rPr>
-              <a:t>)</a:t>
-            </a:r>
-          </a:p>
-          <a:p>
-            <a:r>
-              <a:rPr lang="en-US" sz="800" b="1" dirty="0" smtClean="0">
-                <a:solidFill>
-                  <a:srgbClr val="000000"/>
-                </a:solidFill>
-              </a:rPr>
-              <a:t> </a:t>
-            </a:r>
-            <a:r>
-              <a:rPr lang="en-US" sz="800" dirty="0">
-                <a:solidFill>
-                  <a:srgbClr val="000000"/>
-                </a:solidFill>
-              </a:rPr>
-              <a:t>	</a:t>
-            </a:r>
-            <a:r>
-              <a:rPr lang="en-US" sz="800" b="1" dirty="0">
-                <a:solidFill>
-                  <a:srgbClr val="000000"/>
-                </a:solidFill>
-              </a:rPr>
-              <a:t>public </a:t>
-            </a:r>
-            <a:r>
-              <a:rPr lang="en-US" sz="800" b="1" dirty="0" err="1">
-                <a:solidFill>
-                  <a:srgbClr val="000000"/>
-                </a:solidFill>
-              </a:rPr>
-              <a:t>OptionSet</a:t>
-            </a:r>
-            <a:r>
-              <a:rPr lang="en-US" sz="800" b="1" dirty="0">
-                <a:solidFill>
-                  <a:srgbClr val="000000"/>
-                </a:solidFill>
-              </a:rPr>
-              <a:t>(String name</a:t>
-            </a:r>
-            <a:r>
-              <a:rPr lang="en-US" sz="800" b="1" dirty="0" smtClean="0">
-                <a:solidFill>
-                  <a:srgbClr val="000000"/>
-                </a:solidFill>
-              </a:rPr>
-              <a:t>) </a:t>
-            </a:r>
-            <a:r>
-              <a:rPr lang="en-US" sz="800" dirty="0">
-                <a:solidFill>
-                  <a:srgbClr val="000000"/>
-                </a:solidFill>
-              </a:rPr>
-              <a:t>	</a:t>
-            </a:r>
-          </a:p>
-          <a:p>
-            <a:r>
-              <a:rPr lang="en-US" sz="800" b="1" dirty="0" smtClean="0">
-                <a:solidFill>
-                  <a:srgbClr val="000000"/>
-                </a:solidFill>
-              </a:rPr>
-              <a:t>	public </a:t>
-            </a:r>
-            <a:r>
-              <a:rPr lang="en-US" sz="800" b="1" dirty="0" err="1">
-                <a:solidFill>
-                  <a:srgbClr val="000000"/>
-                </a:solidFill>
-              </a:rPr>
-              <a:t>OptionSet</a:t>
-            </a:r>
-            <a:r>
-              <a:rPr lang="en-US" sz="800" b="1" dirty="0">
-                <a:solidFill>
-                  <a:srgbClr val="000000"/>
-                </a:solidFill>
-              </a:rPr>
-              <a:t>(String name, </a:t>
-            </a:r>
-            <a:r>
-              <a:rPr lang="en-US" sz="800" b="1" dirty="0" err="1">
-                <a:solidFill>
-                  <a:srgbClr val="000000"/>
-                </a:solidFill>
-              </a:rPr>
-              <a:t>int</a:t>
-            </a:r>
-            <a:r>
-              <a:rPr lang="en-US" sz="800" b="1" dirty="0">
-                <a:solidFill>
-                  <a:srgbClr val="000000"/>
-                </a:solidFill>
-              </a:rPr>
-              <a:t> count</a:t>
-            </a:r>
-            <a:r>
-              <a:rPr lang="en-US" sz="800" b="1" dirty="0" smtClean="0">
-                <a:solidFill>
-                  <a:srgbClr val="000000"/>
-                </a:solidFill>
-              </a:rPr>
-              <a:t>) </a:t>
-            </a:r>
-            <a:r>
-              <a:rPr lang="en-US" sz="800" dirty="0">
-                <a:solidFill>
-                  <a:srgbClr val="000000"/>
-                </a:solidFill>
-              </a:rPr>
-              <a:t>	</a:t>
-            </a:r>
-            <a:endParaRPr lang="en-US" sz="800" dirty="0" smtClean="0">
-              <a:solidFill>
-                <a:srgbClr val="000000"/>
-              </a:solidFill>
-            </a:endParaRPr>
-          </a:p>
-          <a:p>
-            <a:r>
-              <a:rPr lang="en-US" sz="800" b="1" dirty="0">
-                <a:solidFill>
-                  <a:srgbClr val="000000"/>
-                </a:solidFill>
-              </a:rPr>
-              <a:t>	</a:t>
-            </a:r>
-            <a:r>
-              <a:rPr lang="en-US" sz="800" b="1" dirty="0" smtClean="0">
-                <a:solidFill>
-                  <a:srgbClr val="000000"/>
-                </a:solidFill>
-              </a:rPr>
-              <a:t>public </a:t>
-            </a:r>
-            <a:r>
-              <a:rPr lang="en-US" sz="800" b="1" dirty="0">
-                <a:solidFill>
-                  <a:srgbClr val="000000"/>
-                </a:solidFill>
-              </a:rPr>
-              <a:t>void </a:t>
-            </a:r>
-            <a:r>
-              <a:rPr lang="en-US" sz="800" b="1" dirty="0" err="1">
-                <a:solidFill>
-                  <a:srgbClr val="000000"/>
-                </a:solidFill>
-              </a:rPr>
-              <a:t>setName</a:t>
-            </a:r>
-            <a:r>
-              <a:rPr lang="en-US" sz="800" b="1" dirty="0">
-                <a:solidFill>
-                  <a:srgbClr val="000000"/>
-                </a:solidFill>
-              </a:rPr>
-              <a:t>(String name) </a:t>
+              <a:t>Automobile</a:t>
             </a:r>
             <a:endParaRPr lang="en-US" sz="800" b="1" dirty="0" smtClean="0">
               <a:solidFill>
@@ -3972,625 +3359,18 @@
               </a:solidFill>
             </a:endParaRPr>
           </a:p>
-          <a:p>
-            <a:r>
-              <a:rPr lang="en-US" sz="800" b="1" dirty="0" smtClean="0">
-                <a:solidFill>
-                  <a:srgbClr val="000000"/>
-                </a:solidFill>
-              </a:rPr>
-              <a:t>	public </a:t>
-            </a:r>
-            <a:r>
-              <a:rPr lang="en-US" sz="800" b="1" dirty="0">
-                <a:solidFill>
-                  <a:srgbClr val="000000"/>
-                </a:solidFill>
-              </a:rPr>
-              <a:t>void </a:t>
-            </a:r>
-            <a:r>
-              <a:rPr lang="en-US" sz="800" b="1" dirty="0" err="1">
-                <a:solidFill>
-                  <a:srgbClr val="000000"/>
-                </a:solidFill>
-              </a:rPr>
-              <a:t>setOptions</a:t>
-            </a:r>
-            <a:r>
-              <a:rPr lang="en-US" sz="800" b="1" dirty="0">
-                <a:solidFill>
-                  <a:srgbClr val="000000"/>
-                </a:solidFill>
-              </a:rPr>
-              <a:t>(</a:t>
-            </a:r>
-            <a:r>
-              <a:rPr lang="en-US" sz="800" b="1" dirty="0" err="1">
-                <a:solidFill>
-                  <a:srgbClr val="000000"/>
-                </a:solidFill>
-              </a:rPr>
-              <a:t>ArrayList</a:t>
-            </a:r>
-            <a:r>
-              <a:rPr lang="en-US" sz="800" b="1" dirty="0">
-                <a:solidFill>
-                  <a:srgbClr val="000000"/>
-                </a:solidFill>
-              </a:rPr>
-              <a:t>&lt;Option&gt; options) </a:t>
-            </a:r>
-            <a:endParaRPr lang="en-US" sz="800" b="1" dirty="0" smtClean="0">
-              <a:solidFill>
-                <a:srgbClr val="000000"/>
-              </a:solidFill>
-            </a:endParaRPr>
-          </a:p>
-          <a:p>
-            <a:r>
-              <a:rPr lang="en-US" sz="800" dirty="0">
-                <a:solidFill>
-                  <a:srgbClr val="000000"/>
-                </a:solidFill>
-              </a:rPr>
-              <a:t>	</a:t>
-            </a:r>
-            <a:r>
-              <a:rPr lang="en-US" sz="800" b="1" dirty="0">
-                <a:solidFill>
-                  <a:srgbClr val="000000"/>
-                </a:solidFill>
-              </a:rPr>
-              <a:t>public void </a:t>
-            </a:r>
-            <a:r>
-              <a:rPr lang="en-US" sz="800" b="1" dirty="0" err="1">
-                <a:solidFill>
-                  <a:srgbClr val="000000"/>
-                </a:solidFill>
-              </a:rPr>
-              <a:t>setOption</a:t>
-            </a:r>
-            <a:r>
-              <a:rPr lang="en-US" sz="800" b="1" dirty="0">
-                <a:solidFill>
-                  <a:srgbClr val="000000"/>
-                </a:solidFill>
-              </a:rPr>
-              <a:t>(</a:t>
-            </a:r>
-            <a:r>
-              <a:rPr lang="en-US" sz="800" b="1" dirty="0" err="1">
-                <a:solidFill>
-                  <a:srgbClr val="000000"/>
-                </a:solidFill>
-              </a:rPr>
-              <a:t>int</a:t>
-            </a:r>
-            <a:r>
-              <a:rPr lang="en-US" sz="800" b="1" dirty="0">
-                <a:solidFill>
-                  <a:srgbClr val="000000"/>
-                </a:solidFill>
-              </a:rPr>
-              <a:t> </a:t>
-            </a:r>
-            <a:r>
-              <a:rPr lang="en-US" sz="800" b="1" dirty="0" err="1">
-                <a:solidFill>
-                  <a:srgbClr val="000000"/>
-                </a:solidFill>
-              </a:rPr>
-              <a:t>i</a:t>
-            </a:r>
-            <a:r>
-              <a:rPr lang="en-US" sz="800" b="1" dirty="0">
-                <a:solidFill>
-                  <a:srgbClr val="000000"/>
-                </a:solidFill>
-              </a:rPr>
-              <a:t>, String name, </a:t>
-            </a:r>
-            <a:r>
-              <a:rPr lang="en-US" sz="800" b="1" dirty="0" err="1">
-                <a:solidFill>
-                  <a:srgbClr val="000000"/>
-                </a:solidFill>
-              </a:rPr>
-              <a:t>int</a:t>
-            </a:r>
-            <a:r>
-              <a:rPr lang="en-US" sz="800" b="1" dirty="0">
-                <a:solidFill>
-                  <a:srgbClr val="000000"/>
-                </a:solidFill>
-              </a:rPr>
-              <a:t> price</a:t>
-            </a:r>
-            <a:r>
-              <a:rPr lang="en-US" sz="800" b="1" dirty="0" smtClean="0">
-                <a:solidFill>
-                  <a:srgbClr val="000000"/>
-                </a:solidFill>
-              </a:rPr>
-              <a:t>)</a:t>
-            </a:r>
-          </a:p>
-          <a:p>
-            <a:r>
-              <a:rPr lang="en-US" sz="800" b="1" dirty="0" smtClean="0">
-                <a:solidFill>
-                  <a:srgbClr val="000000"/>
-                </a:solidFill>
-              </a:rPr>
-              <a:t> </a:t>
-            </a:r>
-            <a:r>
-              <a:rPr lang="da-DK" sz="800" dirty="0">
-                <a:solidFill>
-                  <a:srgbClr val="000000"/>
-                </a:solidFill>
-              </a:rPr>
-              <a:t>	</a:t>
-            </a:r>
-            <a:r>
-              <a:rPr lang="da-DK" sz="800" b="1" dirty="0">
-                <a:solidFill>
-                  <a:srgbClr val="000000"/>
-                </a:solidFill>
-              </a:rPr>
-              <a:t>public Option </a:t>
-            </a:r>
-            <a:r>
-              <a:rPr lang="da-DK" sz="800" b="1" dirty="0" err="1">
-                <a:solidFill>
-                  <a:srgbClr val="000000"/>
-                </a:solidFill>
-              </a:rPr>
-              <a:t>getOption</a:t>
-            </a:r>
-            <a:r>
-              <a:rPr lang="da-DK" sz="800" b="1" dirty="0">
-                <a:solidFill>
-                  <a:srgbClr val="000000"/>
-                </a:solidFill>
-              </a:rPr>
-              <a:t>(</a:t>
-            </a:r>
-            <a:r>
-              <a:rPr lang="da-DK" sz="800" b="1" dirty="0" err="1">
-                <a:solidFill>
-                  <a:srgbClr val="000000"/>
-                </a:solidFill>
-              </a:rPr>
-              <a:t>String</a:t>
-            </a:r>
-            <a:r>
-              <a:rPr lang="da-DK" sz="800" b="1" dirty="0">
-                <a:solidFill>
-                  <a:srgbClr val="000000"/>
-                </a:solidFill>
-              </a:rPr>
-              <a:t> </a:t>
-            </a:r>
-            <a:r>
-              <a:rPr lang="da-DK" sz="800" b="1" dirty="0" err="1">
-                <a:solidFill>
-                  <a:srgbClr val="000000"/>
-                </a:solidFill>
-              </a:rPr>
-              <a:t>name</a:t>
-            </a:r>
-            <a:r>
-              <a:rPr lang="da-DK" sz="800" b="1" dirty="0" smtClean="0">
-                <a:solidFill>
-                  <a:srgbClr val="000000"/>
-                </a:solidFill>
-              </a:rPr>
-              <a:t>) </a:t>
-            </a:r>
-            <a:r>
-              <a:rPr lang="da-DK" sz="800" dirty="0">
-                <a:solidFill>
-                  <a:srgbClr val="000000"/>
-                </a:solidFill>
-              </a:rPr>
-              <a:t>	</a:t>
-            </a:r>
-            <a:endParaRPr lang="da-DK" sz="800" dirty="0" smtClean="0">
-              <a:solidFill>
-                <a:srgbClr val="000000"/>
-              </a:solidFill>
-            </a:endParaRPr>
-          </a:p>
-          <a:p>
-            <a:r>
-              <a:rPr lang="da-DK" sz="800" b="1" dirty="0">
-                <a:solidFill>
-                  <a:srgbClr val="000000"/>
-                </a:solidFill>
-              </a:rPr>
-              <a:t>	</a:t>
-            </a:r>
-            <a:r>
-              <a:rPr lang="da-DK" sz="800" b="1" dirty="0" smtClean="0">
-                <a:solidFill>
-                  <a:srgbClr val="000000"/>
-                </a:solidFill>
-              </a:rPr>
-              <a:t>public </a:t>
-            </a:r>
-            <a:r>
-              <a:rPr lang="da-DK" sz="800" b="1" dirty="0" err="1">
-                <a:solidFill>
-                  <a:srgbClr val="000000"/>
-                </a:solidFill>
-              </a:rPr>
-              <a:t>ArrayList</a:t>
-            </a:r>
-            <a:r>
-              <a:rPr lang="da-DK" sz="800" b="1" dirty="0">
-                <a:solidFill>
-                  <a:srgbClr val="000000"/>
-                </a:solidFill>
-              </a:rPr>
-              <a:t>&lt;Option&gt; </a:t>
-            </a:r>
-            <a:r>
-              <a:rPr lang="da-DK" sz="800" b="1" dirty="0" err="1">
-                <a:solidFill>
-                  <a:srgbClr val="000000"/>
-                </a:solidFill>
-              </a:rPr>
-              <a:t>getOptions</a:t>
-            </a:r>
-            <a:r>
-              <a:rPr lang="da-DK" sz="800" b="1" dirty="0">
-                <a:solidFill>
-                  <a:srgbClr val="000000"/>
-                </a:solidFill>
-              </a:rPr>
-              <a:t>() </a:t>
-            </a:r>
-            <a:r>
-              <a:rPr lang="da-DK" sz="800" dirty="0">
-                <a:solidFill>
-                  <a:srgbClr val="000000"/>
-                </a:solidFill>
-              </a:rPr>
-              <a:t>	</a:t>
-            </a:r>
-            <a:endParaRPr lang="da-DK" sz="800" dirty="0" smtClean="0">
-              <a:solidFill>
-                <a:srgbClr val="000000"/>
-              </a:solidFill>
-            </a:endParaRPr>
-          </a:p>
-          <a:p>
-            <a:r>
-              <a:rPr lang="da-DK" sz="800" b="1" dirty="0">
-                <a:solidFill>
-                  <a:srgbClr val="000000"/>
-                </a:solidFill>
-              </a:rPr>
-              <a:t>	</a:t>
-            </a:r>
-            <a:r>
-              <a:rPr lang="da-DK" sz="800" b="1" dirty="0" smtClean="0">
-                <a:solidFill>
-                  <a:srgbClr val="000000"/>
-                </a:solidFill>
-              </a:rPr>
-              <a:t>public </a:t>
-            </a:r>
-            <a:r>
-              <a:rPr lang="da-DK" sz="800" b="1" dirty="0" err="1">
-                <a:solidFill>
-                  <a:srgbClr val="000000"/>
-                </a:solidFill>
-              </a:rPr>
-              <a:t>String</a:t>
-            </a:r>
-            <a:r>
-              <a:rPr lang="da-DK" sz="800" b="1" dirty="0">
-                <a:solidFill>
-                  <a:srgbClr val="000000"/>
-                </a:solidFill>
-              </a:rPr>
-              <a:t> </a:t>
-            </a:r>
-            <a:r>
-              <a:rPr lang="da-DK" sz="800" b="1" dirty="0" err="1">
-                <a:solidFill>
-                  <a:srgbClr val="000000"/>
-                </a:solidFill>
-              </a:rPr>
-              <a:t>getName</a:t>
-            </a:r>
-            <a:r>
-              <a:rPr lang="da-DK" sz="800" b="1" dirty="0">
-                <a:solidFill>
-                  <a:srgbClr val="000000"/>
-                </a:solidFill>
-              </a:rPr>
-              <a:t>() </a:t>
-            </a:r>
-            <a:endParaRPr lang="da-DK" sz="800" b="1" dirty="0" smtClean="0">
-              <a:solidFill>
-                <a:srgbClr val="000000"/>
-              </a:solidFill>
-            </a:endParaRPr>
-          </a:p>
-          <a:p>
-            <a:r>
-              <a:rPr lang="da-DK" sz="800" dirty="0">
-                <a:solidFill>
-                  <a:srgbClr val="000000"/>
-                </a:solidFill>
-              </a:rPr>
-              <a:t>	</a:t>
-            </a:r>
-            <a:r>
-              <a:rPr lang="da-DK" sz="800" b="1" dirty="0">
-                <a:solidFill>
-                  <a:srgbClr val="000000"/>
-                </a:solidFill>
-              </a:rPr>
-              <a:t>public </a:t>
-            </a:r>
-            <a:r>
-              <a:rPr lang="da-DK" sz="800" b="1" dirty="0" err="1">
-                <a:solidFill>
-                  <a:srgbClr val="000000"/>
-                </a:solidFill>
-              </a:rPr>
-              <a:t>int</a:t>
-            </a:r>
-            <a:r>
-              <a:rPr lang="da-DK" sz="800" b="1" dirty="0">
-                <a:solidFill>
-                  <a:srgbClr val="000000"/>
-                </a:solidFill>
-              </a:rPr>
-              <a:t> </a:t>
-            </a:r>
-            <a:r>
-              <a:rPr lang="da-DK" sz="800" b="1" dirty="0" err="1">
-                <a:solidFill>
-                  <a:srgbClr val="000000"/>
-                </a:solidFill>
-              </a:rPr>
-              <a:t>getOptionPrice</a:t>
-            </a:r>
-            <a:r>
-              <a:rPr lang="da-DK" sz="800" b="1" dirty="0">
-                <a:solidFill>
-                  <a:srgbClr val="000000"/>
-                </a:solidFill>
-              </a:rPr>
-              <a:t>(</a:t>
-            </a:r>
-            <a:r>
-              <a:rPr lang="da-DK" sz="800" b="1" dirty="0" err="1">
-                <a:solidFill>
-                  <a:srgbClr val="000000"/>
-                </a:solidFill>
-              </a:rPr>
-              <a:t>String</a:t>
-            </a:r>
-            <a:r>
-              <a:rPr lang="da-DK" sz="800" b="1" dirty="0">
-                <a:solidFill>
-                  <a:srgbClr val="000000"/>
-                </a:solidFill>
-              </a:rPr>
-              <a:t> </a:t>
-            </a:r>
-            <a:r>
-              <a:rPr lang="da-DK" sz="800" b="1" dirty="0" err="1" smtClean="0">
-                <a:solidFill>
-                  <a:srgbClr val="000000"/>
-                </a:solidFill>
-              </a:rPr>
-              <a:t>name</a:t>
-            </a:r>
-            <a:r>
-              <a:rPr lang="da-DK" sz="800" b="1" dirty="0" smtClean="0">
-                <a:solidFill>
-                  <a:srgbClr val="000000"/>
-                </a:solidFill>
-              </a:rPr>
-              <a:t>)</a:t>
-            </a:r>
-            <a:endParaRPr lang="en-US" sz="800" dirty="0">
-              <a:solidFill>
-                <a:srgbClr val="000000"/>
-              </a:solidFill>
-            </a:endParaRPr>
-          </a:p>
-          <a:p>
-            <a:r>
-              <a:rPr lang="en-US" sz="800" dirty="0">
-                <a:solidFill>
-                  <a:srgbClr val="000000"/>
-                </a:solidFill>
-              </a:rPr>
-              <a:t>	</a:t>
-            </a:r>
-            <a:r>
-              <a:rPr lang="en-US" sz="800" b="1" dirty="0">
-                <a:solidFill>
-                  <a:srgbClr val="000000"/>
-                </a:solidFill>
-              </a:rPr>
-              <a:t>private </a:t>
-            </a:r>
-            <a:r>
-              <a:rPr lang="en-US" sz="800" b="1" dirty="0" err="1">
-                <a:solidFill>
-                  <a:srgbClr val="000000"/>
-                </a:solidFill>
-              </a:rPr>
-              <a:t>int</a:t>
-            </a:r>
-            <a:r>
-              <a:rPr lang="en-US" sz="800" b="1" dirty="0">
-                <a:solidFill>
-                  <a:srgbClr val="000000"/>
-                </a:solidFill>
-              </a:rPr>
-              <a:t> </a:t>
-            </a:r>
-            <a:r>
-              <a:rPr lang="en-US" sz="800" b="1" dirty="0" err="1">
-                <a:solidFill>
-                  <a:srgbClr val="000000"/>
-                </a:solidFill>
-              </a:rPr>
-              <a:t>findOption</a:t>
-            </a:r>
-            <a:r>
-              <a:rPr lang="en-US" sz="800" b="1" dirty="0">
-                <a:solidFill>
-                  <a:srgbClr val="000000"/>
-                </a:solidFill>
-              </a:rPr>
-              <a:t>(String name</a:t>
-            </a:r>
-            <a:r>
-              <a:rPr lang="en-US" sz="800" b="1" dirty="0" smtClean="0">
-                <a:solidFill>
-                  <a:srgbClr val="000000"/>
-                </a:solidFill>
-              </a:rPr>
-              <a:t>) </a:t>
-            </a:r>
-            <a:endParaRPr lang="en-US" sz="800" dirty="0">
-              <a:solidFill>
-                <a:srgbClr val="000000"/>
-              </a:solidFill>
-            </a:endParaRPr>
-          </a:p>
-          <a:p>
-            <a:r>
-              <a:rPr lang="en-US" sz="800" dirty="0">
-                <a:solidFill>
-                  <a:srgbClr val="000000"/>
-                </a:solidFill>
-              </a:rPr>
-              <a:t>	</a:t>
-            </a:r>
-            <a:r>
-              <a:rPr lang="en-US" sz="800" b="1" dirty="0">
-                <a:solidFill>
-                  <a:srgbClr val="000000"/>
-                </a:solidFill>
-              </a:rPr>
-              <a:t>private void </a:t>
-            </a:r>
-            <a:r>
-              <a:rPr lang="en-US" sz="800" b="1" u="sng" dirty="0" err="1">
-                <a:solidFill>
-                  <a:srgbClr val="000000"/>
-                </a:solidFill>
-              </a:rPr>
-              <a:t>deleteOption</a:t>
-            </a:r>
-            <a:r>
-              <a:rPr lang="en-US" sz="800" b="1" u="sng" dirty="0">
-                <a:solidFill>
-                  <a:srgbClr val="000000"/>
-                </a:solidFill>
-              </a:rPr>
-              <a:t>(String name</a:t>
-            </a:r>
-            <a:r>
-              <a:rPr lang="en-US" sz="800" b="1" u="sng" dirty="0" smtClean="0">
-                <a:solidFill>
-                  <a:srgbClr val="000000"/>
-                </a:solidFill>
-              </a:rPr>
-              <a:t>)</a:t>
-            </a:r>
-            <a:endParaRPr lang="en-US" sz="800" dirty="0">
-              <a:solidFill>
-                <a:srgbClr val="000000"/>
-              </a:solidFill>
-            </a:endParaRPr>
-          </a:p>
-        </p:txBody>
-      </p:sp>
-      <p:sp>
-        <p:nvSpPr>
-          <p:cNvPr id="7" name="Rectangle 6"/>
+        </p:txBody>
+      </p:sp>
+      <p:sp>
+        <p:nvSpPr>
+          <p:cNvPr id="9" name="Rectangle 8"/>
           <p:cNvSpPr/>
           <p:nvPr/>
         </p:nvSpPr>
         <p:spPr>
           <a:xfrm>
-            <a:off x="3899602" y="256871"/>
-            <a:ext cx="1299869" cy="378158"/>
-          </a:xfrm>
-          <a:prstGeom prst="rect">
-            <a:avLst/>
-          </a:prstGeom>
-        </p:spPr>
-        <p:style>
-          <a:lnRef idx="1">
-            <a:schemeClr val="accent1"/>
-          </a:lnRef>
-          <a:fillRef idx="3">
-            <a:schemeClr val="accent1"/>
-          </a:fillRef>
-          <a:effectRef idx="2">
-            <a:schemeClr val="accent1"/>
-          </a:effectRef>
-          <a:fontRef idx="minor">
-            <a:schemeClr val="lt1"/>
-          </a:fontRef>
-        </p:style>
-        <p:txBody>
-          <a:bodyPr rtlCol="0" anchor="ctr"/>
-          <a:lstStyle/>
-          <a:p>
-            <a:r>
-              <a:rPr lang="en-US" sz="800" dirty="0" smtClean="0">
-                <a:solidFill>
-                  <a:srgbClr val="000000"/>
-                </a:solidFill>
-              </a:rPr>
-              <a:t>Interface</a:t>
-            </a:r>
-          </a:p>
-          <a:p>
-            <a:pPr algn="ctr"/>
-            <a:r>
-              <a:rPr lang="en-US" sz="800" dirty="0" err="1" smtClean="0">
-                <a:solidFill>
-                  <a:srgbClr val="000000"/>
-                </a:solidFill>
-              </a:rPr>
-              <a:t>Serializable</a:t>
-            </a:r>
-            <a:endParaRPr lang="en-US" sz="800" dirty="0">
-              <a:solidFill>
-                <a:srgbClr val="000000"/>
-              </a:solidFill>
-            </a:endParaRPr>
-          </a:p>
-        </p:txBody>
-      </p:sp>
-      <p:sp>
-        <p:nvSpPr>
-          <p:cNvPr id="8" name="Rectangle 7"/>
-          <p:cNvSpPr/>
-          <p:nvPr/>
-        </p:nvSpPr>
-        <p:spPr>
-          <a:xfrm>
-            <a:off x="5792499" y="1777776"/>
-            <a:ext cx="3144842" cy="1277545"/>
+            <a:off x="7943376" y="1358800"/>
+            <a:ext cx="1235712" cy="431340"/>
           </a:xfrm>
           <a:prstGeom prst="rect">
             <a:avLst/>
@@ -4630,454 +3410,6 @@
                   <a:srgbClr val="000000"/>
                 </a:solidFill>
               </a:rPr>
-              <a:t>	Automobile</a:t>
-            </a:r>
-          </a:p>
-          <a:p>
-            <a:r>
-              <a:rPr lang="en-US" sz="800" b="1" dirty="0" smtClean="0">
-                <a:solidFill>
-                  <a:srgbClr val="000000"/>
-                </a:solidFill>
-              </a:rPr>
-              <a:t>Values 	</a:t>
-            </a:r>
-          </a:p>
-          <a:p>
-            <a:r>
-              <a:rPr lang="en-US" sz="800" b="1" dirty="0" smtClean="0">
-                <a:solidFill>
-                  <a:srgbClr val="000000"/>
-                </a:solidFill>
-              </a:rPr>
-              <a:t>	private </a:t>
-            </a:r>
-            <a:r>
-              <a:rPr lang="en-US" sz="800" b="1" dirty="0">
-                <a:solidFill>
-                  <a:srgbClr val="000000"/>
-                </a:solidFill>
-              </a:rPr>
-              <a:t>static final long </a:t>
-            </a:r>
-            <a:r>
-              <a:rPr lang="en-US" sz="800" b="1" i="1" dirty="0" err="1" smtClean="0">
-                <a:solidFill>
-                  <a:srgbClr val="000000"/>
-                </a:solidFill>
-              </a:rPr>
-              <a:t>serialVersionUID</a:t>
-            </a:r>
-            <a:endParaRPr lang="en-US" sz="800" b="1" i="1" dirty="0">
-              <a:solidFill>
-                <a:srgbClr val="000000"/>
-              </a:solidFill>
-            </a:endParaRPr>
-          </a:p>
-          <a:p>
-            <a:r>
-              <a:rPr lang="en-US" sz="800" b="1" dirty="0">
-                <a:solidFill>
-                  <a:srgbClr val="000000"/>
-                </a:solidFill>
-              </a:rPr>
-              <a:t>	private </a:t>
-            </a:r>
-            <a:r>
-              <a:rPr lang="en-US" sz="800" b="1" dirty="0" err="1">
-                <a:solidFill>
-                  <a:srgbClr val="000000"/>
-                </a:solidFill>
-              </a:rPr>
-              <a:t>LinkedList</a:t>
-            </a:r>
-            <a:r>
-              <a:rPr lang="en-US" sz="800" b="1" dirty="0">
-                <a:solidFill>
-                  <a:srgbClr val="000000"/>
-                </a:solidFill>
-              </a:rPr>
-              <a:t>&lt;</a:t>
-            </a:r>
-            <a:r>
-              <a:rPr lang="en-US" sz="800" b="1" dirty="0" err="1">
-                <a:solidFill>
-                  <a:srgbClr val="000000"/>
-                </a:solidFill>
-              </a:rPr>
-              <a:t>OptionSet</a:t>
-            </a:r>
-            <a:r>
-              <a:rPr lang="en-US" sz="800" b="1" dirty="0">
-                <a:solidFill>
-                  <a:srgbClr val="000000"/>
-                </a:solidFill>
-              </a:rPr>
-              <a:t>&gt; </a:t>
-            </a:r>
-            <a:r>
-              <a:rPr lang="en-US" sz="800" b="1" dirty="0" err="1">
-                <a:solidFill>
-                  <a:srgbClr val="000000"/>
-                </a:solidFill>
-              </a:rPr>
-              <a:t>optionSetList</a:t>
-            </a:r>
-            <a:r>
-              <a:rPr lang="en-US" sz="800" b="1" dirty="0">
-                <a:solidFill>
-                  <a:srgbClr val="000000"/>
-                </a:solidFill>
-              </a:rPr>
-              <a:t>;</a:t>
-            </a:r>
-            <a:endParaRPr lang="en-US" sz="800" b="1" dirty="0" smtClean="0">
-              <a:solidFill>
-                <a:srgbClr val="000000"/>
-              </a:solidFill>
-            </a:endParaRPr>
-          </a:p>
-          <a:p>
-            <a:r>
-              <a:rPr lang="en-US" sz="800" b="1" dirty="0" smtClean="0">
-                <a:solidFill>
-                  <a:srgbClr val="000000"/>
-                </a:solidFill>
-              </a:rPr>
-              <a:t>Methods</a:t>
-            </a:r>
-          </a:p>
-          <a:p>
-            <a:r>
-              <a:rPr lang="en-US" sz="800" b="1" dirty="0" smtClean="0">
-                <a:solidFill>
-                  <a:srgbClr val="000000"/>
-                </a:solidFill>
-              </a:rPr>
-              <a:t>	</a:t>
-            </a:r>
-            <a:r>
-              <a:rPr lang="en-US" sz="800" b="1" dirty="0">
-                <a:solidFill>
-                  <a:srgbClr val="000000"/>
-                </a:solidFill>
-              </a:rPr>
-              <a:t>public Automobile(</a:t>
-            </a:r>
-            <a:r>
-              <a:rPr lang="en-US" sz="800" b="1" dirty="0" smtClean="0">
-                <a:solidFill>
-                  <a:srgbClr val="000000"/>
-                </a:solidFill>
-              </a:rPr>
-              <a:t>)</a:t>
-            </a:r>
-          </a:p>
-          <a:p>
-            <a:r>
-              <a:rPr lang="en-US" sz="800" b="1" dirty="0" smtClean="0">
-                <a:solidFill>
-                  <a:srgbClr val="000000"/>
-                </a:solidFill>
-              </a:rPr>
-              <a:t> </a:t>
-            </a:r>
-            <a:r>
-              <a:rPr lang="da-DK" sz="800" dirty="0">
-                <a:solidFill>
-                  <a:srgbClr val="000000"/>
-                </a:solidFill>
-              </a:rPr>
-              <a:t>	</a:t>
-            </a:r>
-            <a:r>
-              <a:rPr lang="da-DK" sz="800" b="1" dirty="0">
-                <a:solidFill>
-                  <a:srgbClr val="000000"/>
-                </a:solidFill>
-              </a:rPr>
-              <a:t>public </a:t>
-            </a:r>
-            <a:r>
-              <a:rPr lang="da-DK" sz="800" b="1" dirty="0" err="1">
-                <a:solidFill>
-                  <a:srgbClr val="000000"/>
-                </a:solidFill>
-              </a:rPr>
-              <a:t>LinkedList</a:t>
-            </a:r>
-            <a:r>
-              <a:rPr lang="da-DK" sz="800" b="1" dirty="0">
-                <a:solidFill>
-                  <a:srgbClr val="000000"/>
-                </a:solidFill>
-              </a:rPr>
-              <a:t>&lt;</a:t>
-            </a:r>
-            <a:r>
-              <a:rPr lang="da-DK" sz="800" b="1" dirty="0" err="1">
-                <a:solidFill>
-                  <a:srgbClr val="000000"/>
-                </a:solidFill>
-              </a:rPr>
-              <a:t>OptionSet</a:t>
-            </a:r>
-            <a:r>
-              <a:rPr lang="da-DK" sz="800" b="1" dirty="0">
-                <a:solidFill>
-                  <a:srgbClr val="000000"/>
-                </a:solidFill>
-              </a:rPr>
-              <a:t>&gt; </a:t>
-            </a:r>
-            <a:r>
-              <a:rPr lang="da-DK" sz="800" b="1" dirty="0" err="1">
-                <a:solidFill>
-                  <a:srgbClr val="000000"/>
-                </a:solidFill>
-              </a:rPr>
-              <a:t>getOptionSetList</a:t>
-            </a:r>
-            <a:r>
-              <a:rPr lang="da-DK" sz="800" b="1" dirty="0">
-                <a:solidFill>
-                  <a:srgbClr val="000000"/>
-                </a:solidFill>
-              </a:rPr>
-              <a:t>(</a:t>
-            </a:r>
-            <a:r>
-              <a:rPr lang="da-DK" sz="800" b="1" dirty="0" smtClean="0">
-                <a:solidFill>
-                  <a:srgbClr val="000000"/>
-                </a:solidFill>
-              </a:rPr>
-              <a:t>) </a:t>
-            </a:r>
-            <a:r>
-              <a:rPr lang="da-DK" sz="800" dirty="0">
-                <a:solidFill>
-                  <a:srgbClr val="000000"/>
-                </a:solidFill>
-              </a:rPr>
-              <a:t>	</a:t>
-            </a:r>
-            <a:endParaRPr lang="da-DK" sz="800" dirty="0" smtClean="0">
-              <a:solidFill>
-                <a:srgbClr val="000000"/>
-              </a:solidFill>
-            </a:endParaRPr>
-          </a:p>
-          <a:p>
-            <a:r>
-              <a:rPr lang="da-DK" sz="800" b="1" dirty="0">
-                <a:solidFill>
-                  <a:srgbClr val="000000"/>
-                </a:solidFill>
-              </a:rPr>
-              <a:t>	</a:t>
-            </a:r>
-            <a:r>
-              <a:rPr lang="da-DK" sz="800" b="1" dirty="0" smtClean="0">
-                <a:solidFill>
-                  <a:srgbClr val="000000"/>
-                </a:solidFill>
-              </a:rPr>
-              <a:t>public </a:t>
-            </a:r>
-            <a:r>
-              <a:rPr lang="da-DK" sz="800" b="1" dirty="0" err="1">
-                <a:solidFill>
-                  <a:srgbClr val="000000"/>
-                </a:solidFill>
-              </a:rPr>
-              <a:t>void</a:t>
-            </a:r>
-            <a:r>
-              <a:rPr lang="da-DK" sz="800" b="1" dirty="0">
-                <a:solidFill>
-                  <a:srgbClr val="000000"/>
-                </a:solidFill>
-              </a:rPr>
-              <a:t> </a:t>
-            </a:r>
-            <a:r>
-              <a:rPr lang="da-DK" sz="800" b="1" dirty="0" err="1">
-                <a:solidFill>
-                  <a:srgbClr val="000000"/>
-                </a:solidFill>
-              </a:rPr>
-              <a:t>setOptionSetList</a:t>
-            </a:r>
-            <a:r>
-              <a:rPr lang="da-DK" sz="800" b="1" dirty="0">
-                <a:solidFill>
-                  <a:srgbClr val="000000"/>
-                </a:solidFill>
-              </a:rPr>
-              <a:t>(</a:t>
-            </a:r>
-            <a:r>
-              <a:rPr lang="da-DK" sz="800" b="1" dirty="0" err="1">
-                <a:solidFill>
-                  <a:srgbClr val="000000"/>
-                </a:solidFill>
-              </a:rPr>
-              <a:t>LinkedList</a:t>
-            </a:r>
-            <a:r>
-              <a:rPr lang="da-DK" sz="800" b="1" dirty="0">
-                <a:solidFill>
-                  <a:srgbClr val="000000"/>
-                </a:solidFill>
-              </a:rPr>
-              <a:t>&lt;</a:t>
-            </a:r>
-            <a:r>
-              <a:rPr lang="da-DK" sz="800" b="1" dirty="0" err="1">
-                <a:solidFill>
-                  <a:srgbClr val="000000"/>
-                </a:solidFill>
-              </a:rPr>
-              <a:t>OptionSet</a:t>
-            </a:r>
-            <a:r>
-              <a:rPr lang="da-DK" sz="800" b="1" dirty="0">
-                <a:solidFill>
-                  <a:srgbClr val="000000"/>
-                </a:solidFill>
-              </a:rPr>
-              <a:t>&gt; </a:t>
-            </a:r>
-            <a:r>
-              <a:rPr lang="da-DK" sz="800" b="1" dirty="0" err="1">
-                <a:solidFill>
-                  <a:srgbClr val="000000"/>
-                </a:solidFill>
-              </a:rPr>
-              <a:t>osl</a:t>
-            </a:r>
-            <a:r>
-              <a:rPr lang="da-DK" sz="800" b="1" dirty="0" smtClean="0">
-                <a:solidFill>
-                  <a:srgbClr val="000000"/>
-                </a:solidFill>
-              </a:rPr>
-              <a:t>) </a:t>
-            </a:r>
-            <a:r>
-              <a:rPr lang="da-DK" sz="800" dirty="0">
-                <a:solidFill>
-                  <a:srgbClr val="000000"/>
-                </a:solidFill>
-              </a:rPr>
-              <a:t>	</a:t>
-            </a:r>
-            <a:r>
-              <a:rPr lang="da-DK" sz="800" b="1" dirty="0">
-                <a:solidFill>
-                  <a:srgbClr val="000000"/>
-                </a:solidFill>
-              </a:rPr>
-              <a:t>public </a:t>
-            </a:r>
-            <a:r>
-              <a:rPr lang="da-DK" sz="800" b="1" dirty="0" err="1">
-                <a:solidFill>
-                  <a:srgbClr val="000000"/>
-                </a:solidFill>
-              </a:rPr>
-              <a:t>void</a:t>
-            </a:r>
-            <a:r>
-              <a:rPr lang="da-DK" sz="800" b="1" dirty="0">
-                <a:solidFill>
-                  <a:srgbClr val="000000"/>
-                </a:solidFill>
-              </a:rPr>
-              <a:t> </a:t>
-            </a:r>
-            <a:r>
-              <a:rPr lang="da-DK" sz="800" b="1" dirty="0" err="1">
-                <a:solidFill>
-                  <a:srgbClr val="000000"/>
-                </a:solidFill>
-              </a:rPr>
-              <a:t>deleteOptionSetList</a:t>
-            </a:r>
-            <a:r>
-              <a:rPr lang="da-DK" sz="800" b="1" dirty="0">
-                <a:solidFill>
-                  <a:srgbClr val="000000"/>
-                </a:solidFill>
-              </a:rPr>
-              <a:t>(</a:t>
-            </a:r>
-            <a:r>
-              <a:rPr lang="da-DK" sz="800" b="1" dirty="0" smtClean="0">
-                <a:solidFill>
-                  <a:srgbClr val="000000"/>
-                </a:solidFill>
-              </a:rPr>
-              <a:t>)</a:t>
-            </a:r>
-            <a:endParaRPr lang="en-US" sz="800" b="1" dirty="0">
-              <a:solidFill>
-                <a:srgbClr val="000000"/>
-              </a:solidFill>
-            </a:endParaRPr>
-          </a:p>
-        </p:txBody>
-      </p:sp>
-      <p:sp>
-        <p:nvSpPr>
-          <p:cNvPr id="9" name="Rectangle 8"/>
-          <p:cNvSpPr/>
-          <p:nvPr/>
-        </p:nvSpPr>
-        <p:spPr>
-          <a:xfrm>
-            <a:off x="2599736" y="5235983"/>
-            <a:ext cx="2851323" cy="1148344"/>
-          </a:xfrm>
-          <a:prstGeom prst="rect">
-            <a:avLst/>
-          </a:prstGeom>
-        </p:spPr>
-        <p:style>
-          <a:lnRef idx="1">
-            <a:schemeClr val="accent1"/>
-          </a:lnRef>
-          <a:fillRef idx="3">
-            <a:schemeClr val="accent1"/>
-          </a:fillRef>
-          <a:effectRef idx="2">
-            <a:schemeClr val="accent1"/>
-          </a:effectRef>
-          <a:fontRef idx="minor">
-            <a:schemeClr val="lt1"/>
-          </a:fontRef>
-        </p:style>
-        <p:txBody>
-          <a:bodyPr rtlCol="0" anchor="ctr"/>
-          <a:lstStyle/>
-          <a:p>
-            <a:r>
-              <a:rPr lang="en-US" sz="800" b="1" dirty="0" smtClean="0">
-                <a:solidFill>
-                  <a:srgbClr val="000000"/>
-                </a:solidFill>
-              </a:rPr>
-              <a:t>Class</a:t>
-            </a:r>
-          </a:p>
-          <a:p>
-            <a:r>
-              <a:rPr lang="en-US" sz="800" b="1" dirty="0" smtClean="0">
-                <a:solidFill>
-                  <a:srgbClr val="000000"/>
-                </a:solidFill>
-              </a:rPr>
               <a:t>	</a:t>
             </a:r>
             <a:r>
@@ -5089,241 +3421,6 @@
               <a:t>Util</a:t>
             </a:r>
             <a:endParaRPr lang="en-US" sz="800" b="1" dirty="0" smtClean="0">
-              <a:solidFill>
-                <a:srgbClr val="000000"/>
-              </a:solidFill>
-            </a:endParaRPr>
-          </a:p>
-          <a:p>
-            <a:r>
-              <a:rPr lang="en-US" sz="800" b="1" dirty="0" smtClean="0">
-                <a:solidFill>
-                  <a:srgbClr val="000000"/>
-                </a:solidFill>
-              </a:rPr>
-              <a:t>Methods</a:t>
-            </a:r>
-            <a:endParaRPr lang="en-US" sz="800" dirty="0">
-              <a:solidFill>
-                <a:srgbClr val="000000"/>
-              </a:solidFill>
-            </a:endParaRPr>
-          </a:p>
-          <a:p>
-            <a:r>
-              <a:rPr lang="en-US" sz="800" dirty="0">
-                <a:solidFill>
-                  <a:srgbClr val="000000"/>
-                </a:solidFill>
-              </a:rPr>
-              <a:t>	</a:t>
-            </a:r>
-            <a:r>
-              <a:rPr lang="en-US" sz="800" b="1" dirty="0">
-                <a:solidFill>
-                  <a:srgbClr val="000000"/>
-                </a:solidFill>
-              </a:rPr>
-              <a:t>public </a:t>
-            </a:r>
-            <a:r>
-              <a:rPr lang="en-US" sz="800" b="1" dirty="0" err="1">
-                <a:solidFill>
-                  <a:srgbClr val="000000"/>
-                </a:solidFill>
-              </a:rPr>
-              <a:t>Util</a:t>
-            </a:r>
-            <a:r>
-              <a:rPr lang="en-US" sz="800" b="1" dirty="0">
-                <a:solidFill>
-                  <a:srgbClr val="000000"/>
-                </a:solidFill>
-              </a:rPr>
-              <a:t>(){}</a:t>
-            </a:r>
-          </a:p>
-          <a:p>
-            <a:r>
-              <a:rPr lang="en-US" sz="800" dirty="0">
-                <a:solidFill>
-                  <a:srgbClr val="000000"/>
-                </a:solidFill>
-              </a:rPr>
-              <a:t>	</a:t>
-            </a:r>
-            <a:r>
-              <a:rPr lang="en-US" sz="800" b="1" dirty="0">
-                <a:solidFill>
-                  <a:srgbClr val="000000"/>
-                </a:solidFill>
-              </a:rPr>
-              <a:t>public void serialize(Automobile car, String </a:t>
-            </a:r>
-            <a:r>
-              <a:rPr lang="en-US" sz="800" b="1" dirty="0" err="1">
-                <a:solidFill>
-                  <a:srgbClr val="000000"/>
-                </a:solidFill>
-              </a:rPr>
-              <a:t>fileName</a:t>
-            </a:r>
-            <a:r>
-              <a:rPr lang="en-US" sz="800" b="1" dirty="0" smtClean="0">
-                <a:solidFill>
-                  <a:srgbClr val="000000"/>
-                </a:solidFill>
-              </a:rPr>
-              <a:t>)</a:t>
-            </a:r>
-            <a:endParaRPr lang="en-US" sz="800" b="1" dirty="0">
-              <a:solidFill>
-                <a:srgbClr val="000000"/>
-              </a:solidFill>
-            </a:endParaRPr>
-          </a:p>
-          <a:p>
-            <a:r>
-              <a:rPr lang="en-US" sz="800" b="1" dirty="0" smtClean="0">
-                <a:solidFill>
-                  <a:srgbClr val="000000"/>
-                </a:solidFill>
-              </a:rPr>
-              <a:t>	</a:t>
-            </a:r>
-            <a:r>
-              <a:rPr lang="en-US" sz="800" b="1" dirty="0">
-                <a:solidFill>
-                  <a:srgbClr val="000000"/>
-                </a:solidFill>
-              </a:rPr>
-              <a:t>public Automobile </a:t>
-            </a:r>
-            <a:r>
-              <a:rPr lang="en-US" sz="800" b="1" dirty="0" err="1">
-                <a:solidFill>
-                  <a:srgbClr val="000000"/>
-                </a:solidFill>
-              </a:rPr>
-              <a:t>readSerializedFile</a:t>
-            </a:r>
-            <a:r>
-              <a:rPr lang="en-US" sz="800" b="1" dirty="0">
-                <a:solidFill>
-                  <a:srgbClr val="000000"/>
-                </a:solidFill>
-              </a:rPr>
-              <a:t>(String </a:t>
-            </a:r>
-            <a:r>
-              <a:rPr lang="en-US" sz="800" b="1" dirty="0" err="1">
-                <a:solidFill>
-                  <a:srgbClr val="000000"/>
-                </a:solidFill>
-              </a:rPr>
-              <a:t>fileName</a:t>
-            </a:r>
-            <a:r>
-              <a:rPr lang="en-US" sz="800" b="1" dirty="0" smtClean="0">
-                <a:solidFill>
-                  <a:srgbClr val="000000"/>
-                </a:solidFill>
-              </a:rPr>
-              <a:t>)</a:t>
-            </a:r>
-          </a:p>
-          <a:p>
-            <a:r>
-              <a:rPr lang="en-US" sz="800" b="1" dirty="0">
-                <a:solidFill>
-                  <a:srgbClr val="000000"/>
-                </a:solidFill>
-              </a:rPr>
-              <a:t>	public void </a:t>
-            </a:r>
-            <a:r>
-              <a:rPr lang="en-US" sz="800" b="1" dirty="0" err="1">
-                <a:solidFill>
-                  <a:srgbClr val="000000"/>
-                </a:solidFill>
-              </a:rPr>
-              <a:t>writeFile</a:t>
-            </a:r>
-            <a:r>
-              <a:rPr lang="en-US" sz="800" b="1" dirty="0">
-                <a:solidFill>
-                  <a:srgbClr val="000000"/>
-                </a:solidFill>
-              </a:rPr>
-              <a:t>(Automobile </a:t>
-            </a:r>
-            <a:r>
-              <a:rPr lang="en-US" sz="800" b="1" dirty="0" err="1">
-                <a:solidFill>
-                  <a:srgbClr val="000000"/>
-                </a:solidFill>
-              </a:rPr>
-              <a:t>serCar</a:t>
-            </a:r>
-            <a:r>
-              <a:rPr lang="en-US" sz="800" b="1" dirty="0">
-                <a:solidFill>
-                  <a:srgbClr val="000000"/>
-                </a:solidFill>
-              </a:rPr>
-              <a:t>, String </a:t>
-            </a:r>
-            <a:r>
-              <a:rPr lang="en-US" sz="800" b="1" dirty="0" err="1">
-                <a:solidFill>
-                  <a:srgbClr val="000000"/>
-                </a:solidFill>
-              </a:rPr>
-              <a:t>fileName</a:t>
-            </a:r>
-            <a:r>
-              <a:rPr lang="en-US" sz="800" b="1" dirty="0" smtClean="0">
-                <a:solidFill>
-                  <a:srgbClr val="000000"/>
-                </a:solidFill>
-              </a:rPr>
-              <a:t>)</a:t>
-            </a:r>
-          </a:p>
-          <a:p>
-            <a:r>
-              <a:rPr lang="en-US" sz="800" b="1" dirty="0">
-                <a:solidFill>
-                  <a:srgbClr val="000000"/>
-                </a:solidFill>
-              </a:rPr>
-              <a:t>	public Automobile </a:t>
-            </a:r>
-            <a:r>
-              <a:rPr lang="en-US" sz="800" b="1" dirty="0" err="1">
-                <a:solidFill>
-                  <a:srgbClr val="000000"/>
-                </a:solidFill>
-              </a:rPr>
-              <a:t>readFile</a:t>
-            </a:r>
-            <a:r>
-              <a:rPr lang="en-US" sz="800" b="1" dirty="0">
-                <a:solidFill>
-                  <a:srgbClr val="000000"/>
-                </a:solidFill>
-              </a:rPr>
-              <a:t>(String filename</a:t>
-            </a:r>
-            <a:r>
-              <a:rPr lang="en-US" sz="800" b="1" dirty="0" smtClean="0">
-                <a:solidFill>
-                  <a:srgbClr val="000000"/>
-                </a:solidFill>
-              </a:rPr>
-              <a:t>)</a:t>
-            </a:r>
-            <a:endParaRPr lang="en-US" sz="800" dirty="0">
               <a:solidFill>
                 <a:srgbClr val="000000"/>
               </a:solidFill>
@@ -5408,8 +3505,8 @@
         </p:nvCxnSpPr>
         <p:spPr>
           <a:xfrm flipV="1">
-            <a:off x="1329819" y="445950"/>
-            <a:ext cx="2569783" cy="314150"/>
+            <a:off x="1659525" y="445950"/>
+            <a:ext cx="2240077" cy="314151"/>
           </a:xfrm>
           <a:prstGeom prst="straightConnector1">
             <a:avLst/>
@@ -5445,8 +3542,8 @@
         </p:nvCxnSpPr>
         <p:spPr>
           <a:xfrm flipV="1">
-            <a:off x="4025398" y="635029"/>
-            <a:ext cx="524139" cy="1359181"/>
+            <a:off x="3377624" y="635029"/>
+            <a:ext cx="1171913" cy="2821360"/>
           </a:xfrm>
           <a:prstGeom prst="straightConnector1">
             <a:avLst/>
@@ -5483,7 +3580,7 @@
         <p:spPr>
           <a:xfrm>
             <a:off x="5199471" y="445950"/>
-            <a:ext cx="2165449" cy="1331826"/>
+            <a:ext cx="1958039" cy="2245065"/>
           </a:xfrm>
           <a:prstGeom prst="straightConnector1">
             <a:avLst/>
@@ -5512,15 +3609,15 @@
         <p:nvCxnSpPr>
           <p:cNvPr id="20" name="Straight Arrow Connector 19"/>
           <p:cNvCxnSpPr>
-            <a:stCxn id="9" idx="3"/>
-            <a:endCxn id="8" idx="2"/>
+            <a:stCxn id="9" idx="2"/>
+            <a:endCxn id="8" idx="3"/>
           </p:cNvCxnSpPr>
           <p:nvPr/>
         </p:nvCxnSpPr>
         <p:spPr>
-          <a:xfrm flipV="1">
-            <a:off x="5451059" y="3055321"/>
-            <a:ext cx="1913861" cy="2754834"/>
+          <a:xfrm flipH="1">
+            <a:off x="7828410" y="1790140"/>
+            <a:ext cx="732822" cy="1113361"/>
           </a:xfrm>
           <a:prstGeom prst="straightConnector1">
             <a:avLst/>
@@ -5556,8 +3653,8 @@
         </p:nvCxnSpPr>
         <p:spPr>
           <a:xfrm>
-            <a:off x="1329819" y="2671909"/>
-            <a:ext cx="1400031" cy="577706"/>
+            <a:off x="1659525" y="1129433"/>
+            <a:ext cx="1070325" cy="2538126"/>
           </a:xfrm>
           <a:prstGeom prst="straightConnector1">
             <a:avLst/>
@@ -5593,8 +3690,8 @@
         </p:nvCxnSpPr>
         <p:spPr>
           <a:xfrm flipV="1">
-            <a:off x="5320946" y="2416549"/>
-            <a:ext cx="471553" cy="833066"/>
+            <a:off x="4025398" y="2903501"/>
+            <a:ext cx="2461212" cy="764058"/>
           </a:xfrm>
           <a:prstGeom prst="straightConnector1">
             <a:avLst/>
@@ -5627,7 +3724,7 @@
         </p:nvSpPr>
         <p:spPr>
           <a:xfrm>
-            <a:off x="2361737" y="265697"/>
+            <a:off x="2805010" y="256871"/>
             <a:ext cx="242825" cy="369332"/>
           </a:xfrm>
           <a:prstGeom prst="rect">
@@ -5687,7 +3784,7 @@
         </p:nvSpPr>
         <p:spPr>
           <a:xfrm>
-            <a:off x="6229653" y="760100"/>
+            <a:off x="5967103" y="1129433"/>
             <a:ext cx="242825" cy="369332"/>
           </a:xfrm>
           <a:prstGeom prst="rect">
@@ -5717,7 +3814,7 @@
         </p:nvSpPr>
         <p:spPr>
           <a:xfrm>
-            <a:off x="1759376" y="2888904"/>
+            <a:off x="1816986" y="2167699"/>
             <a:ext cx="318229" cy="369332"/>
           </a:xfrm>
           <a:prstGeom prst="rect">
@@ -5746,7 +3843,7 @@
         </p:nvSpPr>
         <p:spPr>
           <a:xfrm>
-            <a:off x="1188682" y="2669872"/>
+            <a:off x="1459744" y="1427881"/>
             <a:ext cx="299631" cy="369332"/>
           </a:xfrm>
           <a:prstGeom prst="rect">
@@ -5775,7 +3872,7 @@
         </p:nvSpPr>
         <p:spPr>
           <a:xfrm>
-            <a:off x="5301243" y="3258236"/>
+            <a:off x="4160533" y="3710685"/>
             <a:ext cx="299631" cy="369332"/>
           </a:xfrm>
           <a:prstGeom prst="rect">
@@ -5805,7 +3902,7 @@
         </p:nvSpPr>
         <p:spPr>
           <a:xfrm>
-            <a:off x="2304931" y="3258236"/>
+            <a:off x="2081176" y="3271723"/>
             <a:ext cx="301660" cy="369332"/>
           </a:xfrm>
           <a:prstGeom prst="rect">
@@ -5823,7 +3920,6 @@
               <a:rPr lang="en-US" dirty="0"/>
               <a:t>1</a:t>
             </a:r>
-            <a:endParaRPr lang="en-US" dirty="0"/>
           </a:p>
         </p:txBody>
       </p:sp>
@@ -5835,7 +3931,7 @@
         </p:nvSpPr>
         <p:spPr>
           <a:xfrm>
-            <a:off x="5490839" y="2047217"/>
+            <a:off x="6184950" y="2906363"/>
             <a:ext cx="301660" cy="369332"/>
           </a:xfrm>
           <a:prstGeom prst="rect">
@@ -5864,7 +3960,7 @@
         </p:nvSpPr>
         <p:spPr>
           <a:xfrm>
-            <a:off x="5459737" y="2854538"/>
+            <a:off x="5199471" y="3298227"/>
             <a:ext cx="318229" cy="369332"/>
           </a:xfrm>
           <a:prstGeom prst="rect">
@@ -5894,7 +3990,7 @@
         </p:nvSpPr>
         <p:spPr>
           <a:xfrm>
-            <a:off x="6088516" y="4121149"/>
+            <a:off x="8167227" y="2352365"/>
             <a:ext cx="318229" cy="369332"/>
           </a:xfrm>
           <a:prstGeom prst="rect">
@@ -5924,7 +4020,7 @@
         <p:spPr>
           <a:xfrm>
             <a:off x="167725" y="6440742"/>
-            <a:ext cx="2533228" cy="369332"/>
+            <a:ext cx="4393638" cy="369332"/>
           </a:xfrm>
           <a:prstGeom prst="rect">
             <a:avLst/>
@@ -5938,8 +4034,1162 @@
           <a:lstStyle/>
           <a:p>
             <a:r>
-              <a:rPr lang="en-US" dirty="0" err="1" smtClean="0"/>
-              <a:t>gongz@andrew.cmu.edu</a:t>
+              <a:rPr lang="en-US" dirty="0" smtClean="0"/>
+              <a:t>Class details are described in following pages</a:t>
+            </a:r>
+            <a:endParaRPr lang="en-US" dirty="0"/>
+          </a:p>
+        </p:txBody>
+      </p:sp>
+      <p:sp>
+        <p:nvSpPr>
+          <p:cNvPr id="42" name="Rectangle 41"/>
+          <p:cNvSpPr/>
+          <p:nvPr/>
+        </p:nvSpPr>
+        <p:spPr>
+          <a:xfrm>
+            <a:off x="433739" y="4741170"/>
+            <a:ext cx="1299869" cy="378158"/>
+          </a:xfrm>
+          <a:prstGeom prst="rect">
+            <a:avLst/>
+          </a:prstGeom>
+        </p:spPr>
+        <p:style>
+          <a:lnRef idx="1">
+            <a:schemeClr val="accent1"/>
+          </a:lnRef>
+          <a:fillRef idx="3">
+            <a:schemeClr val="accent1"/>
+          </a:fillRef>
+          <a:effectRef idx="2">
+            <a:schemeClr val="accent1"/>
+          </a:effectRef>
+          <a:fontRef idx="minor">
+            <a:schemeClr val="lt1"/>
+          </a:fontRef>
+        </p:style>
+        <p:txBody>
+          <a:bodyPr rtlCol="0" anchor="ctr"/>
+          <a:lstStyle/>
+          <a:p>
+            <a:r>
+              <a:rPr lang="en-US" sz="800" dirty="0" smtClean="0">
+                <a:solidFill>
+                  <a:srgbClr val="000000"/>
+                </a:solidFill>
+              </a:rPr>
+              <a:t>Interface</a:t>
+            </a:r>
+          </a:p>
+          <a:p>
+            <a:pPr algn="ctr"/>
+            <a:r>
+              <a:rPr lang="en-US" sz="800" dirty="0" err="1" smtClean="0">
+                <a:solidFill>
+                  <a:srgbClr val="000000"/>
+                </a:solidFill>
+              </a:rPr>
+              <a:t>CanModifyAll</a:t>
+            </a:r>
+            <a:endParaRPr lang="en-US" sz="800" dirty="0">
+              <a:solidFill>
+                <a:srgbClr val="000000"/>
+              </a:solidFill>
+            </a:endParaRPr>
+          </a:p>
+        </p:txBody>
+      </p:sp>
+      <p:sp>
+        <p:nvSpPr>
+          <p:cNvPr id="43" name="Rectangle 42"/>
+          <p:cNvSpPr/>
+          <p:nvPr/>
+        </p:nvSpPr>
+        <p:spPr>
+          <a:xfrm>
+            <a:off x="433739" y="5408782"/>
+            <a:ext cx="1299869" cy="378158"/>
+          </a:xfrm>
+          <a:prstGeom prst="rect">
+            <a:avLst/>
+          </a:prstGeom>
+        </p:spPr>
+        <p:style>
+          <a:lnRef idx="1">
+            <a:schemeClr val="accent1"/>
+          </a:lnRef>
+          <a:fillRef idx="3">
+            <a:schemeClr val="accent1"/>
+          </a:fillRef>
+          <a:effectRef idx="2">
+            <a:schemeClr val="accent1"/>
+          </a:effectRef>
+          <a:fontRef idx="minor">
+            <a:schemeClr val="lt1"/>
+          </a:fontRef>
+        </p:style>
+        <p:txBody>
+          <a:bodyPr rtlCol="0" anchor="ctr"/>
+          <a:lstStyle/>
+          <a:p>
+            <a:r>
+              <a:rPr lang="en-US" sz="800" dirty="0" smtClean="0">
+                <a:solidFill>
+                  <a:srgbClr val="000000"/>
+                </a:solidFill>
+              </a:rPr>
+              <a:t>Interface</a:t>
+            </a:r>
+          </a:p>
+          <a:p>
+            <a:pPr algn="ctr"/>
+            <a:r>
+              <a:rPr lang="en-US" sz="800" dirty="0" err="1" smtClean="0">
+                <a:solidFill>
+                  <a:srgbClr val="000000"/>
+                </a:solidFill>
+              </a:rPr>
+              <a:t>CanModifySelf</a:t>
+            </a:r>
+            <a:endParaRPr lang="en-US" sz="800" dirty="0">
+              <a:solidFill>
+                <a:srgbClr val="000000"/>
+              </a:solidFill>
+            </a:endParaRPr>
+          </a:p>
+        </p:txBody>
+      </p:sp>
+      <p:sp>
+        <p:nvSpPr>
+          <p:cNvPr id="44" name="Rectangle 43"/>
+          <p:cNvSpPr/>
+          <p:nvPr/>
+        </p:nvSpPr>
+        <p:spPr>
+          <a:xfrm>
+            <a:off x="433739" y="6009331"/>
+            <a:ext cx="1299869" cy="378158"/>
+          </a:xfrm>
+          <a:prstGeom prst="rect">
+            <a:avLst/>
+          </a:prstGeom>
+        </p:spPr>
+        <p:style>
+          <a:lnRef idx="1">
+            <a:schemeClr val="accent1"/>
+          </a:lnRef>
+          <a:fillRef idx="3">
+            <a:schemeClr val="accent1"/>
+          </a:fillRef>
+          <a:effectRef idx="2">
+            <a:schemeClr val="accent1"/>
+          </a:effectRef>
+          <a:fontRef idx="minor">
+            <a:schemeClr val="lt1"/>
+          </a:fontRef>
+        </p:style>
+        <p:txBody>
+          <a:bodyPr rtlCol="0" anchor="ctr"/>
+          <a:lstStyle/>
+          <a:p>
+            <a:r>
+              <a:rPr lang="en-US" sz="800" dirty="0" smtClean="0">
+                <a:solidFill>
+                  <a:srgbClr val="000000"/>
+                </a:solidFill>
+              </a:rPr>
+              <a:t>Interface</a:t>
+            </a:r>
+          </a:p>
+          <a:p>
+            <a:pPr algn="ctr"/>
+            <a:r>
+              <a:rPr lang="en-US" sz="800" dirty="0" err="1" smtClean="0">
+                <a:solidFill>
+                  <a:srgbClr val="000000"/>
+                </a:solidFill>
+              </a:rPr>
+              <a:t>CanRead</a:t>
+            </a:r>
+            <a:endParaRPr lang="en-US" sz="800" dirty="0">
+              <a:solidFill>
+                <a:srgbClr val="000000"/>
+              </a:solidFill>
+            </a:endParaRPr>
+          </a:p>
+        </p:txBody>
+      </p:sp>
+      <p:sp>
+        <p:nvSpPr>
+          <p:cNvPr id="45" name="Rectangle 44"/>
+          <p:cNvSpPr/>
+          <p:nvPr/>
+        </p:nvSpPr>
+        <p:spPr>
+          <a:xfrm>
+            <a:off x="2429979" y="5407316"/>
+            <a:ext cx="1235712" cy="431340"/>
+          </a:xfrm>
+          <a:prstGeom prst="rect">
+            <a:avLst/>
+          </a:prstGeom>
+        </p:spPr>
+        <p:style>
+          <a:lnRef idx="1">
+            <a:schemeClr val="accent1"/>
+          </a:lnRef>
+          <a:fillRef idx="3">
+            <a:schemeClr val="accent1"/>
+          </a:fillRef>
+          <a:effectRef idx="2">
+            <a:schemeClr val="accent1"/>
+          </a:effectRef>
+          <a:fontRef idx="minor">
+            <a:schemeClr val="lt1"/>
+          </a:fontRef>
+        </p:style>
+        <p:txBody>
+          <a:bodyPr rtlCol="0" anchor="ctr"/>
+          <a:lstStyle/>
+          <a:p>
+            <a:r>
+              <a:rPr lang="en-US" sz="800" b="1" dirty="0" smtClean="0">
+                <a:solidFill>
+                  <a:srgbClr val="000000"/>
+                </a:solidFill>
+              </a:rPr>
+              <a:t>Class</a:t>
+            </a:r>
+          </a:p>
+          <a:p>
+            <a:r>
+              <a:rPr lang="en-US" sz="800" b="1" dirty="0" smtClean="0">
+                <a:solidFill>
+                  <a:srgbClr val="000000"/>
+                </a:solidFill>
+              </a:rPr>
+              <a:t>	</a:t>
+            </a:r>
+            <a:r>
+              <a:rPr lang="en-US" sz="800" b="1" dirty="0" smtClean="0">
+                <a:solidFill>
+                  <a:srgbClr val="000000"/>
+                </a:solidFill>
+              </a:rPr>
+              <a:t>Runner</a:t>
+            </a:r>
+            <a:endParaRPr lang="en-US" sz="800" b="1" dirty="0" smtClean="0">
+              <a:solidFill>
+                <a:srgbClr val="000000"/>
+              </a:solidFill>
+            </a:endParaRPr>
+          </a:p>
+        </p:txBody>
+      </p:sp>
+      <p:cxnSp>
+        <p:nvCxnSpPr>
+          <p:cNvPr id="47" name="Straight Arrow Connector 46"/>
+          <p:cNvCxnSpPr>
+            <a:stCxn id="45" idx="1"/>
+            <a:endCxn id="42" idx="3"/>
+          </p:cNvCxnSpPr>
+          <p:nvPr/>
+        </p:nvCxnSpPr>
+        <p:spPr>
+          <a:xfrm flipH="1" flipV="1">
+            <a:off x="1733608" y="4930249"/>
+            <a:ext cx="696371" cy="692737"/>
+          </a:xfrm>
+          <a:prstGeom prst="straightConnector1">
+            <a:avLst/>
+          </a:prstGeom>
+          <a:ln>
+            <a:headEnd type="arrow"/>
+            <a:tailEnd type="arrow"/>
+          </a:ln>
+        </p:spPr>
+        <p:style>
+          <a:lnRef idx="2">
+            <a:schemeClr val="accent1"/>
+          </a:lnRef>
+          <a:fillRef idx="0">
+            <a:schemeClr val="accent1"/>
+          </a:fillRef>
+          <a:effectRef idx="1">
+            <a:schemeClr val="accent1"/>
+          </a:effectRef>
+          <a:fontRef idx="minor">
+            <a:schemeClr val="tx1"/>
+          </a:fontRef>
+        </p:style>
+      </p:cxnSp>
+      <p:cxnSp>
+        <p:nvCxnSpPr>
+          <p:cNvPr id="49" name="Straight Arrow Connector 48"/>
+          <p:cNvCxnSpPr>
+            <a:stCxn id="45" idx="1"/>
+            <a:endCxn id="43" idx="3"/>
+          </p:cNvCxnSpPr>
+          <p:nvPr/>
+        </p:nvCxnSpPr>
+        <p:spPr>
+          <a:xfrm flipH="1" flipV="1">
+            <a:off x="1733608" y="5597861"/>
+            <a:ext cx="696371" cy="25125"/>
+          </a:xfrm>
+          <a:prstGeom prst="straightConnector1">
+            <a:avLst/>
+          </a:prstGeom>
+          <a:ln>
+            <a:headEnd type="arrow"/>
+            <a:tailEnd type="arrow"/>
+          </a:ln>
+        </p:spPr>
+        <p:style>
+          <a:lnRef idx="2">
+            <a:schemeClr val="accent1"/>
+          </a:lnRef>
+          <a:fillRef idx="0">
+            <a:schemeClr val="accent1"/>
+          </a:fillRef>
+          <a:effectRef idx="1">
+            <a:schemeClr val="accent1"/>
+          </a:effectRef>
+          <a:fontRef idx="minor">
+            <a:schemeClr val="tx1"/>
+          </a:fontRef>
+        </p:style>
+      </p:cxnSp>
+      <p:cxnSp>
+        <p:nvCxnSpPr>
+          <p:cNvPr id="51" name="Straight Arrow Connector 50"/>
+          <p:cNvCxnSpPr>
+            <a:stCxn id="45" idx="1"/>
+            <a:endCxn id="44" idx="3"/>
+          </p:cNvCxnSpPr>
+          <p:nvPr/>
+        </p:nvCxnSpPr>
+        <p:spPr>
+          <a:xfrm flipH="1">
+            <a:off x="1733608" y="5622986"/>
+            <a:ext cx="696371" cy="575424"/>
+          </a:xfrm>
+          <a:prstGeom prst="straightConnector1">
+            <a:avLst/>
+          </a:prstGeom>
+          <a:ln>
+            <a:headEnd type="arrow"/>
+            <a:tailEnd type="arrow"/>
+          </a:ln>
+        </p:spPr>
+        <p:style>
+          <a:lnRef idx="2">
+            <a:schemeClr val="accent1"/>
+          </a:lnRef>
+          <a:fillRef idx="0">
+            <a:schemeClr val="accent1"/>
+          </a:fillRef>
+          <a:effectRef idx="1">
+            <a:schemeClr val="accent1"/>
+          </a:effectRef>
+          <a:fontRef idx="minor">
+            <a:schemeClr val="tx1"/>
+          </a:fontRef>
+        </p:style>
+      </p:cxnSp>
+      <p:sp>
+        <p:nvSpPr>
+          <p:cNvPr id="52" name="TextBox 51"/>
+          <p:cNvSpPr txBox="1"/>
+          <p:nvPr/>
+        </p:nvSpPr>
+        <p:spPr>
+          <a:xfrm>
+            <a:off x="2049878" y="4749996"/>
+            <a:ext cx="242825" cy="369332"/>
+          </a:xfrm>
+          <a:prstGeom prst="rect">
+            <a:avLst/>
+          </a:prstGeom>
+          <a:noFill/>
+        </p:spPr>
+        <p:txBody>
+          <a:bodyPr wrap="none" rtlCol="0">
+            <a:spAutoFit/>
+          </a:bodyPr>
+          <a:lstStyle/>
+          <a:p>
+            <a:r>
+              <a:rPr lang="en-US" dirty="0" smtClean="0"/>
+              <a:t>I</a:t>
+            </a:r>
+            <a:endParaRPr lang="en-US" dirty="0"/>
+          </a:p>
+        </p:txBody>
+      </p:sp>
+      <p:sp>
+        <p:nvSpPr>
+          <p:cNvPr id="53" name="TextBox 52"/>
+          <p:cNvSpPr txBox="1"/>
+          <p:nvPr/>
+        </p:nvSpPr>
+        <p:spPr>
+          <a:xfrm>
+            <a:off x="1853061" y="5379992"/>
+            <a:ext cx="242825" cy="369332"/>
+          </a:xfrm>
+          <a:prstGeom prst="rect">
+            <a:avLst/>
+          </a:prstGeom>
+          <a:noFill/>
+        </p:spPr>
+        <p:txBody>
+          <a:bodyPr wrap="none" rtlCol="0">
+            <a:spAutoFit/>
+          </a:bodyPr>
+          <a:lstStyle/>
+          <a:p>
+            <a:r>
+              <a:rPr lang="en-US" dirty="0" smtClean="0"/>
+              <a:t>I</a:t>
+            </a:r>
+            <a:endParaRPr lang="en-US" dirty="0"/>
+          </a:p>
+        </p:txBody>
+      </p:sp>
+      <p:sp>
+        <p:nvSpPr>
+          <p:cNvPr id="54" name="TextBox 53"/>
+          <p:cNvSpPr txBox="1"/>
+          <p:nvPr/>
+        </p:nvSpPr>
+        <p:spPr>
+          <a:xfrm>
+            <a:off x="1974474" y="5958044"/>
+            <a:ext cx="242825" cy="369332"/>
+          </a:xfrm>
+          <a:prstGeom prst="rect">
+            <a:avLst/>
+          </a:prstGeom>
+          <a:noFill/>
+        </p:spPr>
+        <p:txBody>
+          <a:bodyPr wrap="none" rtlCol="0">
+            <a:spAutoFit/>
+          </a:bodyPr>
+          <a:lstStyle/>
+          <a:p>
+            <a:r>
+              <a:rPr lang="en-US" dirty="0" smtClean="0"/>
+              <a:t>I</a:t>
+            </a:r>
+            <a:endParaRPr lang="en-US" dirty="0"/>
+          </a:p>
+        </p:txBody>
+      </p:sp>
+      <p:sp>
+        <p:nvSpPr>
+          <p:cNvPr id="55" name="Rectangle 54"/>
+          <p:cNvSpPr/>
+          <p:nvPr/>
+        </p:nvSpPr>
+        <p:spPr>
+          <a:xfrm>
+            <a:off x="7026473" y="4301402"/>
+            <a:ext cx="1299869" cy="378158"/>
+          </a:xfrm>
+          <a:prstGeom prst="rect">
+            <a:avLst/>
+          </a:prstGeom>
+        </p:spPr>
+        <p:style>
+          <a:lnRef idx="1">
+            <a:schemeClr val="accent1"/>
+          </a:lnRef>
+          <a:fillRef idx="3">
+            <a:schemeClr val="accent1"/>
+          </a:fillRef>
+          <a:effectRef idx="2">
+            <a:schemeClr val="accent1"/>
+          </a:effectRef>
+          <a:fontRef idx="minor">
+            <a:schemeClr val="lt1"/>
+          </a:fontRef>
+        </p:style>
+        <p:txBody>
+          <a:bodyPr rtlCol="0" anchor="ctr"/>
+          <a:lstStyle/>
+          <a:p>
+            <a:r>
+              <a:rPr lang="en-US" sz="800" dirty="0" smtClean="0">
+                <a:solidFill>
+                  <a:srgbClr val="000000"/>
+                </a:solidFill>
+              </a:rPr>
+              <a:t>Class</a:t>
+            </a:r>
+            <a:endParaRPr lang="en-US" sz="800" dirty="0" smtClean="0">
+              <a:solidFill>
+                <a:srgbClr val="000000"/>
+              </a:solidFill>
+            </a:endParaRPr>
+          </a:p>
+          <a:p>
+            <a:pPr algn="ctr"/>
+            <a:r>
+              <a:rPr lang="en-US" sz="800" dirty="0" err="1" smtClean="0">
+                <a:solidFill>
+                  <a:srgbClr val="000000"/>
+                </a:solidFill>
+              </a:rPr>
+              <a:t>kbbSystem</a:t>
+            </a:r>
+            <a:endParaRPr lang="en-US" sz="800" dirty="0">
+              <a:solidFill>
+                <a:srgbClr val="000000"/>
+              </a:solidFill>
+            </a:endParaRPr>
+          </a:p>
+        </p:txBody>
+      </p:sp>
+      <p:cxnSp>
+        <p:nvCxnSpPr>
+          <p:cNvPr id="57" name="Straight Arrow Connector 56"/>
+          <p:cNvCxnSpPr>
+            <a:stCxn id="8" idx="2"/>
+            <a:endCxn id="55" idx="0"/>
+          </p:cNvCxnSpPr>
+          <p:nvPr/>
+        </p:nvCxnSpPr>
+        <p:spPr>
+          <a:xfrm>
+            <a:off x="7157510" y="3115986"/>
+            <a:ext cx="518898" cy="1185416"/>
+          </a:xfrm>
+          <a:prstGeom prst="straightConnector1">
+            <a:avLst/>
+          </a:prstGeom>
+          <a:ln>
+            <a:headEnd type="arrow"/>
+            <a:tailEnd type="arrow"/>
+          </a:ln>
+        </p:spPr>
+        <p:style>
+          <a:lnRef idx="2">
+            <a:schemeClr val="accent1"/>
+          </a:lnRef>
+          <a:fillRef idx="0">
+            <a:schemeClr val="accent1"/>
+          </a:fillRef>
+          <a:effectRef idx="1">
+            <a:schemeClr val="accent1"/>
+          </a:effectRef>
+          <a:fontRef idx="minor">
+            <a:schemeClr val="tx1"/>
+          </a:fontRef>
+        </p:style>
+      </p:cxnSp>
+      <p:sp>
+        <p:nvSpPr>
+          <p:cNvPr id="58" name="TextBox 57"/>
+          <p:cNvSpPr txBox="1"/>
+          <p:nvPr/>
+        </p:nvSpPr>
+        <p:spPr>
+          <a:xfrm>
+            <a:off x="6876657" y="3257235"/>
+            <a:ext cx="299631" cy="369332"/>
+          </a:xfrm>
+          <a:prstGeom prst="rect">
+            <a:avLst/>
+          </a:prstGeom>
+          <a:noFill/>
+        </p:spPr>
+        <p:txBody>
+          <a:bodyPr wrap="none" rtlCol="0">
+            <a:spAutoFit/>
+          </a:bodyPr>
+          <a:lstStyle/>
+          <a:p>
+            <a:r>
+              <a:rPr lang="en-US" dirty="0" smtClean="0"/>
+              <a:t>*</a:t>
+            </a:r>
+            <a:endParaRPr lang="en-US" dirty="0"/>
+          </a:p>
+        </p:txBody>
+      </p:sp>
+      <p:sp>
+        <p:nvSpPr>
+          <p:cNvPr id="59" name="TextBox 58"/>
+          <p:cNvSpPr txBox="1"/>
+          <p:nvPr/>
+        </p:nvSpPr>
+        <p:spPr>
+          <a:xfrm>
+            <a:off x="7696471" y="3895351"/>
+            <a:ext cx="301660" cy="369332"/>
+          </a:xfrm>
+          <a:prstGeom prst="rect">
+            <a:avLst/>
+          </a:prstGeom>
+          <a:noFill/>
+        </p:spPr>
+        <p:txBody>
+          <a:bodyPr wrap="none" rtlCol="0">
+            <a:spAutoFit/>
+          </a:bodyPr>
+          <a:lstStyle/>
+          <a:p>
+            <a:r>
+              <a:rPr lang="en-US" dirty="0"/>
+              <a:t>1</a:t>
+            </a:r>
+          </a:p>
+        </p:txBody>
+      </p:sp>
+      <p:sp>
+        <p:nvSpPr>
+          <p:cNvPr id="60" name="TextBox 59"/>
+          <p:cNvSpPr txBox="1"/>
+          <p:nvPr/>
+        </p:nvSpPr>
+        <p:spPr>
+          <a:xfrm>
+            <a:off x="7176289" y="3526019"/>
+            <a:ext cx="389206" cy="369332"/>
+          </a:xfrm>
+          <a:prstGeom prst="rect">
+            <a:avLst/>
+          </a:prstGeom>
+          <a:noFill/>
+        </p:spPr>
+        <p:txBody>
+          <a:bodyPr wrap="square" rtlCol="0">
+            <a:spAutoFit/>
+          </a:bodyPr>
+          <a:lstStyle/>
+          <a:p>
+            <a:r>
+              <a:rPr lang="en-US" dirty="0"/>
+              <a:t>A</a:t>
+            </a:r>
+          </a:p>
+        </p:txBody>
+      </p:sp>
+      <p:sp>
+        <p:nvSpPr>
+          <p:cNvPr id="61" name="Rectangle 60"/>
+          <p:cNvSpPr/>
+          <p:nvPr/>
+        </p:nvSpPr>
+        <p:spPr>
+          <a:xfrm>
+            <a:off x="7247265" y="445950"/>
+            <a:ext cx="1299869" cy="378158"/>
+          </a:xfrm>
+          <a:prstGeom prst="rect">
+            <a:avLst/>
+          </a:prstGeom>
+        </p:spPr>
+        <p:style>
+          <a:lnRef idx="1">
+            <a:schemeClr val="accent1"/>
+          </a:lnRef>
+          <a:fillRef idx="3">
+            <a:schemeClr val="accent1"/>
+          </a:fillRef>
+          <a:effectRef idx="2">
+            <a:schemeClr val="accent1"/>
+          </a:effectRef>
+          <a:fontRef idx="minor">
+            <a:schemeClr val="lt1"/>
+          </a:fontRef>
+        </p:style>
+        <p:txBody>
+          <a:bodyPr rtlCol="0" anchor="ctr"/>
+          <a:lstStyle/>
+          <a:p>
+            <a:r>
+              <a:rPr lang="en-US" sz="800" dirty="0" smtClean="0">
+                <a:solidFill>
+                  <a:srgbClr val="000000"/>
+                </a:solidFill>
+              </a:rPr>
+              <a:t>Abstract Class</a:t>
+            </a:r>
+            <a:endParaRPr lang="en-US" sz="800" dirty="0" smtClean="0">
+              <a:solidFill>
+                <a:srgbClr val="000000"/>
+              </a:solidFill>
+            </a:endParaRPr>
+          </a:p>
+          <a:p>
+            <a:pPr algn="ctr"/>
+            <a:r>
+              <a:rPr lang="en-US" sz="800" dirty="0" smtClean="0">
+                <a:solidFill>
+                  <a:srgbClr val="000000"/>
+                </a:solidFill>
+              </a:rPr>
+              <a:t>Product</a:t>
+            </a:r>
+            <a:endParaRPr lang="en-US" sz="800" dirty="0">
+              <a:solidFill>
+                <a:srgbClr val="000000"/>
+              </a:solidFill>
+            </a:endParaRPr>
+          </a:p>
+        </p:txBody>
+      </p:sp>
+      <p:cxnSp>
+        <p:nvCxnSpPr>
+          <p:cNvPr id="63" name="Straight Arrow Connector 62"/>
+          <p:cNvCxnSpPr>
+            <a:stCxn id="61" idx="2"/>
+            <a:endCxn id="8" idx="0"/>
+          </p:cNvCxnSpPr>
+          <p:nvPr/>
+        </p:nvCxnSpPr>
+        <p:spPr>
+          <a:xfrm flipH="1">
+            <a:off x="7157510" y="824108"/>
+            <a:ext cx="739690" cy="1866907"/>
+          </a:xfrm>
+          <a:prstGeom prst="straightConnector1">
+            <a:avLst/>
+          </a:prstGeom>
+          <a:ln>
+            <a:headEnd type="arrow"/>
+            <a:tailEnd type="arrow"/>
+          </a:ln>
+        </p:spPr>
+        <p:style>
+          <a:lnRef idx="2">
+            <a:schemeClr val="accent1"/>
+          </a:lnRef>
+          <a:fillRef idx="0">
+            <a:schemeClr val="accent1"/>
+          </a:fillRef>
+          <a:effectRef idx="1">
+            <a:schemeClr val="accent1"/>
+          </a:effectRef>
+          <a:fontRef idx="minor">
+            <a:schemeClr val="tx1"/>
+          </a:fontRef>
+        </p:style>
+      </p:cxnSp>
+      <p:sp>
+        <p:nvSpPr>
+          <p:cNvPr id="64" name="TextBox 63"/>
+          <p:cNvSpPr txBox="1"/>
+          <p:nvPr/>
+        </p:nvSpPr>
+        <p:spPr>
+          <a:xfrm>
+            <a:off x="7247265" y="1574470"/>
+            <a:ext cx="318229" cy="369332"/>
+          </a:xfrm>
+          <a:prstGeom prst="rect">
+            <a:avLst/>
+          </a:prstGeom>
+          <a:noFill/>
+        </p:spPr>
+        <p:txBody>
+          <a:bodyPr wrap="none" rtlCol="0">
+            <a:spAutoFit/>
+          </a:bodyPr>
+          <a:lstStyle/>
+          <a:p>
+            <a:r>
+              <a:rPr lang="en-US" dirty="0"/>
+              <a:t>A</a:t>
+            </a:r>
+          </a:p>
+        </p:txBody>
+      </p:sp>
+      <p:cxnSp>
+        <p:nvCxnSpPr>
+          <p:cNvPr id="84" name="Straight Arrow Connector 83"/>
+          <p:cNvCxnSpPr>
+            <a:stCxn id="4" idx="3"/>
+            <a:endCxn id="8" idx="1"/>
+          </p:cNvCxnSpPr>
+          <p:nvPr/>
+        </p:nvCxnSpPr>
+        <p:spPr>
+          <a:xfrm>
+            <a:off x="2192650" y="944767"/>
+            <a:ext cx="4293960" cy="1958734"/>
+          </a:xfrm>
+          <a:prstGeom prst="straightConnector1">
+            <a:avLst/>
+          </a:prstGeom>
+          <a:ln>
+            <a:headEnd type="arrow"/>
+            <a:tailEnd type="arrow"/>
+          </a:ln>
+        </p:spPr>
+        <p:style>
+          <a:lnRef idx="2">
+            <a:schemeClr val="accent1"/>
+          </a:lnRef>
+          <a:fillRef idx="0">
+            <a:schemeClr val="accent1"/>
+          </a:fillRef>
+          <a:effectRef idx="1">
+            <a:schemeClr val="accent1"/>
+          </a:effectRef>
+          <a:fontRef idx="minor">
+            <a:schemeClr val="tx1"/>
+          </a:fontRef>
+        </p:style>
+      </p:cxnSp>
+      <p:sp>
+        <p:nvSpPr>
+          <p:cNvPr id="85" name="TextBox 84"/>
+          <p:cNvSpPr txBox="1"/>
+          <p:nvPr/>
+        </p:nvSpPr>
+        <p:spPr>
+          <a:xfrm>
+            <a:off x="4763386" y="2135433"/>
+            <a:ext cx="318229" cy="369332"/>
+          </a:xfrm>
+          <a:prstGeom prst="rect">
+            <a:avLst/>
+          </a:prstGeom>
+          <a:noFill/>
+        </p:spPr>
+        <p:txBody>
+          <a:bodyPr wrap="none" rtlCol="0">
+            <a:spAutoFit/>
+          </a:bodyPr>
+          <a:lstStyle/>
+          <a:p>
+            <a:r>
+              <a:rPr lang="en-US" dirty="0"/>
+              <a:t>A</a:t>
+            </a:r>
+          </a:p>
+        </p:txBody>
+      </p:sp>
+      <p:sp>
+        <p:nvSpPr>
+          <p:cNvPr id="86" name="TextBox 85"/>
+          <p:cNvSpPr txBox="1"/>
+          <p:nvPr/>
+        </p:nvSpPr>
+        <p:spPr>
+          <a:xfrm>
+            <a:off x="2233020" y="1076184"/>
+            <a:ext cx="299631" cy="369332"/>
+          </a:xfrm>
+          <a:prstGeom prst="rect">
+            <a:avLst/>
+          </a:prstGeom>
+          <a:noFill/>
+        </p:spPr>
+        <p:txBody>
+          <a:bodyPr wrap="none" rtlCol="0">
+            <a:spAutoFit/>
+          </a:bodyPr>
+          <a:lstStyle/>
+          <a:p>
+            <a:r>
+              <a:rPr lang="en-US" dirty="0"/>
+              <a:t>*</a:t>
+            </a:r>
+          </a:p>
+        </p:txBody>
+      </p:sp>
+      <p:sp>
+        <p:nvSpPr>
+          <p:cNvPr id="87" name="TextBox 86"/>
+          <p:cNvSpPr txBox="1"/>
+          <p:nvPr/>
+        </p:nvSpPr>
+        <p:spPr>
+          <a:xfrm>
+            <a:off x="6059098" y="2537031"/>
+            <a:ext cx="301660" cy="369332"/>
+          </a:xfrm>
+          <a:prstGeom prst="rect">
+            <a:avLst/>
+          </a:prstGeom>
+          <a:noFill/>
+        </p:spPr>
+        <p:txBody>
+          <a:bodyPr wrap="none" rtlCol="0">
+            <a:spAutoFit/>
+          </a:bodyPr>
+          <a:lstStyle/>
+          <a:p>
+            <a:r>
+              <a:rPr lang="en-US" dirty="0"/>
+              <a:t>1</a:t>
+            </a:r>
+          </a:p>
+        </p:txBody>
+      </p:sp>
+      <p:sp>
+        <p:nvSpPr>
+          <p:cNvPr id="88" name="Rectangle 87"/>
+          <p:cNvSpPr/>
+          <p:nvPr/>
+        </p:nvSpPr>
+        <p:spPr>
+          <a:xfrm>
+            <a:off x="4549536" y="4851432"/>
+            <a:ext cx="1299869" cy="378158"/>
+          </a:xfrm>
+          <a:prstGeom prst="rect">
+            <a:avLst/>
+          </a:prstGeom>
+        </p:spPr>
+        <p:style>
+          <a:lnRef idx="1">
+            <a:schemeClr val="accent1"/>
+          </a:lnRef>
+          <a:fillRef idx="3">
+            <a:schemeClr val="accent1"/>
+          </a:fillRef>
+          <a:effectRef idx="2">
+            <a:schemeClr val="accent1"/>
+          </a:effectRef>
+          <a:fontRef idx="minor">
+            <a:schemeClr val="lt1"/>
+          </a:fontRef>
+        </p:style>
+        <p:txBody>
+          <a:bodyPr rtlCol="0" anchor="ctr"/>
+          <a:lstStyle/>
+          <a:p>
+            <a:r>
+              <a:rPr lang="en-US" sz="800" dirty="0" smtClean="0">
+                <a:solidFill>
+                  <a:srgbClr val="000000"/>
+                </a:solidFill>
+              </a:rPr>
+              <a:t>Interface</a:t>
+            </a:r>
+          </a:p>
+          <a:p>
+            <a:pPr algn="ctr"/>
+            <a:r>
+              <a:rPr lang="en-US" sz="800" dirty="0" smtClean="0">
+                <a:solidFill>
+                  <a:srgbClr val="000000"/>
+                </a:solidFill>
+              </a:rPr>
+              <a:t>Find</a:t>
+            </a:r>
+            <a:endParaRPr lang="en-US" sz="800" dirty="0">
+              <a:solidFill>
+                <a:srgbClr val="000000"/>
+              </a:solidFill>
+            </a:endParaRPr>
+          </a:p>
+        </p:txBody>
+      </p:sp>
+      <p:cxnSp>
+        <p:nvCxnSpPr>
+          <p:cNvPr id="90" name="Straight Arrow Connector 89"/>
+          <p:cNvCxnSpPr>
+            <a:stCxn id="88" idx="3"/>
+            <a:endCxn id="55" idx="1"/>
+          </p:cNvCxnSpPr>
+          <p:nvPr/>
+        </p:nvCxnSpPr>
+        <p:spPr>
+          <a:xfrm flipV="1">
+            <a:off x="5849405" y="4490481"/>
+            <a:ext cx="1177068" cy="550030"/>
+          </a:xfrm>
+          <a:prstGeom prst="straightConnector1">
+            <a:avLst/>
+          </a:prstGeom>
+          <a:ln>
+            <a:headEnd type="arrow"/>
+            <a:tailEnd type="arrow"/>
+          </a:ln>
+        </p:spPr>
+        <p:style>
+          <a:lnRef idx="2">
+            <a:schemeClr val="accent1"/>
+          </a:lnRef>
+          <a:fillRef idx="0">
+            <a:schemeClr val="accent1"/>
+          </a:fillRef>
+          <a:effectRef idx="1">
+            <a:schemeClr val="accent1"/>
+          </a:effectRef>
+          <a:fontRef idx="minor">
+            <a:schemeClr val="tx1"/>
+          </a:fontRef>
+        </p:style>
+      </p:cxnSp>
+      <p:cxnSp>
+        <p:nvCxnSpPr>
+          <p:cNvPr id="92" name="Straight Arrow Connector 91"/>
+          <p:cNvCxnSpPr>
+            <a:stCxn id="88" idx="0"/>
+            <a:endCxn id="8" idx="2"/>
+          </p:cNvCxnSpPr>
+          <p:nvPr/>
+        </p:nvCxnSpPr>
+        <p:spPr>
+          <a:xfrm flipV="1">
+            <a:off x="5199471" y="3115986"/>
+            <a:ext cx="1958039" cy="1735446"/>
+          </a:xfrm>
+          <a:prstGeom prst="straightConnector1">
+            <a:avLst/>
+          </a:prstGeom>
+          <a:ln>
+            <a:headEnd type="arrow"/>
+            <a:tailEnd type="arrow"/>
+          </a:ln>
+        </p:spPr>
+        <p:style>
+          <a:lnRef idx="2">
+            <a:schemeClr val="accent1"/>
+          </a:lnRef>
+          <a:fillRef idx="0">
+            <a:schemeClr val="accent1"/>
+          </a:fillRef>
+          <a:effectRef idx="1">
+            <a:schemeClr val="accent1"/>
+          </a:effectRef>
+          <a:fontRef idx="minor">
+            <a:schemeClr val="tx1"/>
+          </a:fontRef>
+        </p:style>
+      </p:cxnSp>
+      <p:cxnSp>
+        <p:nvCxnSpPr>
+          <p:cNvPr id="94" name="Straight Arrow Connector 93"/>
+          <p:cNvCxnSpPr>
+            <a:stCxn id="88" idx="0"/>
+            <a:endCxn id="6" idx="2"/>
+          </p:cNvCxnSpPr>
+          <p:nvPr/>
+        </p:nvCxnSpPr>
+        <p:spPr>
+          <a:xfrm flipH="1" flipV="1">
+            <a:off x="3377624" y="3878728"/>
+            <a:ext cx="1821847" cy="972704"/>
+          </a:xfrm>
+          <a:prstGeom prst="straightConnector1">
+            <a:avLst/>
+          </a:prstGeom>
+          <a:ln>
+            <a:headEnd type="arrow"/>
+            <a:tailEnd type="arrow"/>
+          </a:ln>
+        </p:spPr>
+        <p:style>
+          <a:lnRef idx="2">
+            <a:schemeClr val="accent1"/>
+          </a:lnRef>
+          <a:fillRef idx="0">
+            <a:schemeClr val="accent1"/>
+          </a:fillRef>
+          <a:effectRef idx="1">
+            <a:schemeClr val="accent1"/>
+          </a:effectRef>
+          <a:fontRef idx="minor">
+            <a:schemeClr val="tx1"/>
+          </a:fontRef>
+        </p:style>
+      </p:cxnSp>
+      <p:sp>
+        <p:nvSpPr>
+          <p:cNvPr id="95" name="TextBox 94"/>
+          <p:cNvSpPr txBox="1"/>
+          <p:nvPr/>
+        </p:nvSpPr>
+        <p:spPr>
+          <a:xfrm>
+            <a:off x="4093934" y="4301198"/>
+            <a:ext cx="242825" cy="369332"/>
+          </a:xfrm>
+          <a:prstGeom prst="rect">
+            <a:avLst/>
+          </a:prstGeom>
+          <a:noFill/>
+        </p:spPr>
+        <p:txBody>
+          <a:bodyPr wrap="none" rtlCol="0">
+            <a:spAutoFit/>
+          </a:bodyPr>
+          <a:lstStyle/>
+          <a:p>
+            <a:r>
+              <a:rPr lang="en-US" dirty="0" smtClean="0"/>
+              <a:t>I</a:t>
+            </a:r>
+            <a:endParaRPr lang="en-US" dirty="0"/>
+          </a:p>
+        </p:txBody>
+      </p:sp>
+      <p:sp>
+        <p:nvSpPr>
+          <p:cNvPr id="96" name="TextBox 95"/>
+          <p:cNvSpPr txBox="1"/>
+          <p:nvPr/>
+        </p:nvSpPr>
+        <p:spPr>
+          <a:xfrm>
+            <a:off x="6110061" y="3932070"/>
+            <a:ext cx="242825" cy="369332"/>
+          </a:xfrm>
+          <a:prstGeom prst="rect">
+            <a:avLst/>
+          </a:prstGeom>
+          <a:noFill/>
+        </p:spPr>
+        <p:txBody>
+          <a:bodyPr wrap="none" rtlCol="0">
+            <a:spAutoFit/>
+          </a:bodyPr>
+          <a:lstStyle/>
+          <a:p>
+            <a:r>
+              <a:rPr lang="en-US" dirty="0" smtClean="0"/>
+              <a:t>I</a:t>
+            </a:r>
+            <a:endParaRPr lang="en-US" dirty="0"/>
+          </a:p>
+        </p:txBody>
+      </p:sp>
+      <p:sp>
+        <p:nvSpPr>
+          <p:cNvPr id="97" name="TextBox 96"/>
+          <p:cNvSpPr txBox="1"/>
+          <p:nvPr/>
+        </p:nvSpPr>
+        <p:spPr>
+          <a:xfrm>
+            <a:off x="6460196" y="4676575"/>
+            <a:ext cx="242825" cy="369332"/>
+          </a:xfrm>
+          <a:prstGeom prst="rect">
+            <a:avLst/>
+          </a:prstGeom>
+          <a:noFill/>
+        </p:spPr>
+        <p:txBody>
+          <a:bodyPr wrap="none" rtlCol="0">
+            <a:spAutoFit/>
+          </a:bodyPr>
+          <a:lstStyle/>
+          <a:p>
+            <a:r>
+              <a:rPr lang="en-US" dirty="0" smtClean="0"/>
+              <a:t>I</a:t>
             </a:r>
             <a:endParaRPr lang="en-US" dirty="0"/>
           </a:p>
@@ -5949,6 +5199,895 @@
     <p:extLst>
       <p:ext uri="{BB962C8B-B14F-4D97-AF65-F5344CB8AC3E}">
         <p14:creationId xmlns:p14="http://schemas.microsoft.com/office/powerpoint/2010/main" val="1332685881"/>
+      </p:ext>
+    </p:extLst>
+  </p:cSld>
+  <p:clrMapOvr>
+    <a:masterClrMapping/>
+  </p:clrMapOvr>
+</p:sld>
+</file>
+
+<file path=ppt/slides/slide2.xml><?xml version="1.0" encoding="utf-8"?>
+<p:sld xmlns:a="http://schemas.openxmlformats.org/drawingml/2006/main" xmlns:r="http://schemas.openxmlformats.org/officeDocument/2006/relationships" xmlns:p="http://schemas.openxmlformats.org/presentationml/2006/main">
+  <p:cSld>
+    <p:spTree>
+      <p:nvGrpSpPr>
+        <p:cNvPr id="1" name=""/>
+        <p:cNvGrpSpPr/>
+        <p:nvPr/>
+      </p:nvGrpSpPr>
+      <p:grpSpPr>
+        <a:xfrm>
+          <a:off x="0" y="0"/>
+          <a:ext cx="0" cy="0"/>
+          <a:chOff x="0" y="0"/>
+          <a:chExt cx="0" cy="0"/>
+        </a:xfrm>
+      </p:grpSpPr>
+      <p:sp>
+        <p:nvSpPr>
+          <p:cNvPr id="5" name="Rectangle 4"/>
+          <p:cNvSpPr/>
+          <p:nvPr/>
+        </p:nvSpPr>
+        <p:spPr>
+          <a:xfrm>
+            <a:off x="308703" y="1306000"/>
+            <a:ext cx="3354497" cy="3462699"/>
+          </a:xfrm>
+          <a:prstGeom prst="rect">
+            <a:avLst/>
+          </a:prstGeom>
+        </p:spPr>
+        <p:style>
+          <a:lnRef idx="1">
+            <a:schemeClr val="accent1"/>
+          </a:lnRef>
+          <a:fillRef idx="3">
+            <a:schemeClr val="accent1"/>
+          </a:fillRef>
+          <a:effectRef idx="2">
+            <a:schemeClr val="accent1"/>
+          </a:effectRef>
+          <a:fontRef idx="minor">
+            <a:schemeClr val="lt1"/>
+          </a:fontRef>
+        </p:style>
+        <p:txBody>
+          <a:bodyPr rtlCol="0" anchor="t"/>
+          <a:lstStyle/>
+          <a:p>
+            <a:r>
+              <a:rPr lang="en-US" sz="1600" dirty="0" smtClean="0">
+                <a:solidFill>
+                  <a:srgbClr val="000000"/>
+                </a:solidFill>
+              </a:rPr>
+              <a:t>Class: Option</a:t>
+            </a:r>
+            <a:endParaRPr lang="en-US" sz="1600" dirty="0">
+              <a:solidFill>
+                <a:srgbClr val="000000"/>
+              </a:solidFill>
+            </a:endParaRPr>
+          </a:p>
+        </p:txBody>
+      </p:sp>
+      <p:pic>
+        <p:nvPicPr>
+          <p:cNvPr id="6" name="Picture 5"/>
+          <p:cNvPicPr>
+            <a:picLocks noChangeAspect="1"/>
+          </p:cNvPicPr>
+          <p:nvPr/>
+        </p:nvPicPr>
+        <p:blipFill>
+          <a:blip r:embed="rId2"/>
+          <a:stretch>
+            <a:fillRect/>
+          </a:stretch>
+        </p:blipFill>
+        <p:spPr>
+          <a:xfrm>
+            <a:off x="487896" y="1817767"/>
+            <a:ext cx="2806700" cy="2743200"/>
+          </a:xfrm>
+          <a:prstGeom prst="rect">
+            <a:avLst/>
+          </a:prstGeom>
+        </p:spPr>
+      </p:pic>
+      <p:sp>
+        <p:nvSpPr>
+          <p:cNvPr id="7" name="Rectangle 6"/>
+          <p:cNvSpPr/>
+          <p:nvPr/>
+        </p:nvSpPr>
+        <p:spPr>
+          <a:xfrm>
+            <a:off x="3809751" y="514060"/>
+            <a:ext cx="5163530" cy="5703268"/>
+          </a:xfrm>
+          <a:prstGeom prst="rect">
+            <a:avLst/>
+          </a:prstGeom>
+        </p:spPr>
+        <p:style>
+          <a:lnRef idx="1">
+            <a:schemeClr val="accent1"/>
+          </a:lnRef>
+          <a:fillRef idx="3">
+            <a:schemeClr val="accent1"/>
+          </a:fillRef>
+          <a:effectRef idx="2">
+            <a:schemeClr val="accent1"/>
+          </a:effectRef>
+          <a:fontRef idx="minor">
+            <a:schemeClr val="lt1"/>
+          </a:fontRef>
+        </p:style>
+        <p:txBody>
+          <a:bodyPr rtlCol="0" anchor="t"/>
+          <a:lstStyle/>
+          <a:p>
+            <a:r>
+              <a:rPr lang="en-US" sz="1600" dirty="0" smtClean="0">
+                <a:solidFill>
+                  <a:srgbClr val="000000"/>
+                </a:solidFill>
+              </a:rPr>
+              <a:t>Class: </a:t>
+            </a:r>
+            <a:r>
+              <a:rPr lang="en-US" sz="1600" dirty="0" err="1" smtClean="0">
+                <a:solidFill>
+                  <a:srgbClr val="000000"/>
+                </a:solidFill>
+              </a:rPr>
+              <a:t>OptionSet</a:t>
+            </a:r>
+            <a:endParaRPr lang="en-US" sz="1600" dirty="0">
+              <a:solidFill>
+                <a:srgbClr val="000000"/>
+              </a:solidFill>
+            </a:endParaRPr>
+          </a:p>
+        </p:txBody>
+      </p:sp>
+      <p:pic>
+        <p:nvPicPr>
+          <p:cNvPr id="9" name="Picture 8"/>
+          <p:cNvPicPr>
+            <a:picLocks noChangeAspect="1"/>
+          </p:cNvPicPr>
+          <p:nvPr/>
+        </p:nvPicPr>
+        <p:blipFill>
+          <a:blip r:embed="rId3"/>
+          <a:stretch>
+            <a:fillRect/>
+          </a:stretch>
+        </p:blipFill>
+        <p:spPr>
+          <a:xfrm>
+            <a:off x="4507909" y="1125991"/>
+            <a:ext cx="3530600" cy="4737100"/>
+          </a:xfrm>
+          <a:prstGeom prst="rect">
+            <a:avLst/>
+          </a:prstGeom>
+        </p:spPr>
+      </p:pic>
+    </p:spTree>
+    <p:extLst>
+      <p:ext uri="{BB962C8B-B14F-4D97-AF65-F5344CB8AC3E}">
+        <p14:creationId xmlns:p14="http://schemas.microsoft.com/office/powerpoint/2010/main" val="3292872642"/>
+      </p:ext>
+    </p:extLst>
+  </p:cSld>
+  <p:clrMapOvr>
+    <a:masterClrMapping/>
+  </p:clrMapOvr>
+</p:sld>
+</file>
+
+<file path=ppt/slides/slide3.xml><?xml version="1.0" encoding="utf-8"?>
+<p:sld xmlns:a="http://schemas.openxmlformats.org/drawingml/2006/main" xmlns:r="http://schemas.openxmlformats.org/officeDocument/2006/relationships" xmlns:p="http://schemas.openxmlformats.org/presentationml/2006/main">
+  <p:cSld>
+    <p:spTree>
+      <p:nvGrpSpPr>
+        <p:cNvPr id="1" name=""/>
+        <p:cNvGrpSpPr/>
+        <p:nvPr/>
+      </p:nvGrpSpPr>
+      <p:grpSpPr>
+        <a:xfrm>
+          <a:off x="0" y="0"/>
+          <a:ext cx="0" cy="0"/>
+          <a:chOff x="0" y="0"/>
+          <a:chExt cx="0" cy="0"/>
+        </a:xfrm>
+      </p:grpSpPr>
+      <p:sp>
+        <p:nvSpPr>
+          <p:cNvPr id="6" name="Rectangle 5"/>
+          <p:cNvSpPr/>
+          <p:nvPr/>
+        </p:nvSpPr>
+        <p:spPr>
+          <a:xfrm>
+            <a:off x="1629328" y="310371"/>
+            <a:ext cx="5966212" cy="6459263"/>
+          </a:xfrm>
+          <a:prstGeom prst="rect">
+            <a:avLst/>
+          </a:prstGeom>
+        </p:spPr>
+        <p:style>
+          <a:lnRef idx="1">
+            <a:schemeClr val="accent1"/>
+          </a:lnRef>
+          <a:fillRef idx="3">
+            <a:schemeClr val="accent1"/>
+          </a:fillRef>
+          <a:effectRef idx="2">
+            <a:schemeClr val="accent1"/>
+          </a:effectRef>
+          <a:fontRef idx="minor">
+            <a:schemeClr val="lt1"/>
+          </a:fontRef>
+        </p:style>
+        <p:txBody>
+          <a:bodyPr rtlCol="0" anchor="t"/>
+          <a:lstStyle/>
+          <a:p>
+            <a:r>
+              <a:rPr lang="en-US" sz="1600" dirty="0" smtClean="0">
+                <a:solidFill>
+                  <a:srgbClr val="000000"/>
+                </a:solidFill>
+              </a:rPr>
+              <a:t>Class: Automobile</a:t>
+            </a:r>
+            <a:endParaRPr lang="en-US" sz="1600" dirty="0">
+              <a:solidFill>
+                <a:srgbClr val="000000"/>
+              </a:solidFill>
+            </a:endParaRPr>
+          </a:p>
+        </p:txBody>
+      </p:sp>
+      <p:pic>
+        <p:nvPicPr>
+          <p:cNvPr id="8" name="Picture 7"/>
+          <p:cNvPicPr>
+            <a:picLocks noChangeAspect="1"/>
+          </p:cNvPicPr>
+          <p:nvPr/>
+        </p:nvPicPr>
+        <p:blipFill>
+          <a:blip r:embed="rId2"/>
+          <a:stretch>
+            <a:fillRect/>
+          </a:stretch>
+        </p:blipFill>
+        <p:spPr>
+          <a:xfrm>
+            <a:off x="2290784" y="648188"/>
+            <a:ext cx="4826000" cy="5956300"/>
+          </a:xfrm>
+          <a:prstGeom prst="rect">
+            <a:avLst/>
+          </a:prstGeom>
+        </p:spPr>
+      </p:pic>
+    </p:spTree>
+    <p:extLst>
+      <p:ext uri="{BB962C8B-B14F-4D97-AF65-F5344CB8AC3E}">
+        <p14:creationId xmlns:p14="http://schemas.microsoft.com/office/powerpoint/2010/main" val="534455113"/>
+      </p:ext>
+    </p:extLst>
+  </p:cSld>
+  <p:clrMapOvr>
+    <a:masterClrMapping/>
+  </p:clrMapOvr>
+</p:sld>
+</file>
+
+<file path=ppt/slides/slide4.xml><?xml version="1.0" encoding="utf-8"?>
+<p:sld xmlns:a="http://schemas.openxmlformats.org/drawingml/2006/main" xmlns:r="http://schemas.openxmlformats.org/officeDocument/2006/relationships" xmlns:p="http://schemas.openxmlformats.org/presentationml/2006/main">
+  <p:cSld>
+    <p:spTree>
+      <p:nvGrpSpPr>
+        <p:cNvPr id="1" name=""/>
+        <p:cNvGrpSpPr/>
+        <p:nvPr/>
+      </p:nvGrpSpPr>
+      <p:grpSpPr>
+        <a:xfrm>
+          <a:off x="0" y="0"/>
+          <a:ext cx="0" cy="0"/>
+          <a:chOff x="0" y="0"/>
+          <a:chExt cx="0" cy="0"/>
+        </a:xfrm>
+      </p:grpSpPr>
+      <p:sp>
+        <p:nvSpPr>
+          <p:cNvPr id="4" name="Rectangle 3"/>
+          <p:cNvSpPr/>
+          <p:nvPr/>
+        </p:nvSpPr>
+        <p:spPr>
+          <a:xfrm>
+            <a:off x="308703" y="503207"/>
+            <a:ext cx="3656792" cy="2588038"/>
+          </a:xfrm>
+          <a:prstGeom prst="rect">
+            <a:avLst/>
+          </a:prstGeom>
+        </p:spPr>
+        <p:style>
+          <a:lnRef idx="1">
+            <a:schemeClr val="accent1"/>
+          </a:lnRef>
+          <a:fillRef idx="3">
+            <a:schemeClr val="accent1"/>
+          </a:fillRef>
+          <a:effectRef idx="2">
+            <a:schemeClr val="accent1"/>
+          </a:effectRef>
+          <a:fontRef idx="minor">
+            <a:schemeClr val="lt1"/>
+          </a:fontRef>
+        </p:style>
+        <p:txBody>
+          <a:bodyPr rtlCol="0" anchor="t"/>
+          <a:lstStyle/>
+          <a:p>
+            <a:r>
+              <a:rPr lang="en-US" sz="1600" dirty="0" smtClean="0">
+                <a:solidFill>
+                  <a:srgbClr val="000000"/>
+                </a:solidFill>
+              </a:rPr>
+              <a:t>Class: </a:t>
+            </a:r>
+            <a:r>
+              <a:rPr lang="en-US" sz="1600" dirty="0" err="1" smtClean="0">
+                <a:solidFill>
+                  <a:srgbClr val="000000"/>
+                </a:solidFill>
+              </a:rPr>
+              <a:t>Util</a:t>
+            </a:r>
+            <a:endParaRPr lang="en-US" sz="1600" dirty="0">
+              <a:solidFill>
+                <a:srgbClr val="000000"/>
+              </a:solidFill>
+            </a:endParaRPr>
+          </a:p>
+        </p:txBody>
+      </p:sp>
+      <p:pic>
+        <p:nvPicPr>
+          <p:cNvPr id="5" name="Picture 4"/>
+          <p:cNvPicPr>
+            <a:picLocks noChangeAspect="1"/>
+          </p:cNvPicPr>
+          <p:nvPr/>
+        </p:nvPicPr>
+        <p:blipFill>
+          <a:blip r:embed="rId2"/>
+          <a:stretch>
+            <a:fillRect/>
+          </a:stretch>
+        </p:blipFill>
+        <p:spPr>
+          <a:xfrm>
+            <a:off x="308703" y="1254606"/>
+            <a:ext cx="3479800" cy="1371600"/>
+          </a:xfrm>
+          <a:prstGeom prst="rect">
+            <a:avLst/>
+          </a:prstGeom>
+        </p:spPr>
+      </p:pic>
+      <p:sp>
+        <p:nvSpPr>
+          <p:cNvPr id="7" name="Rectangle 6"/>
+          <p:cNvSpPr/>
+          <p:nvPr/>
+        </p:nvSpPr>
+        <p:spPr>
+          <a:xfrm>
+            <a:off x="4117895" y="503207"/>
+            <a:ext cx="4939248" cy="2588038"/>
+          </a:xfrm>
+          <a:prstGeom prst="rect">
+            <a:avLst/>
+          </a:prstGeom>
+        </p:spPr>
+        <p:style>
+          <a:lnRef idx="1">
+            <a:schemeClr val="accent1"/>
+          </a:lnRef>
+          <a:fillRef idx="3">
+            <a:schemeClr val="accent1"/>
+          </a:fillRef>
+          <a:effectRef idx="2">
+            <a:schemeClr val="accent1"/>
+          </a:effectRef>
+          <a:fontRef idx="minor">
+            <a:schemeClr val="lt1"/>
+          </a:fontRef>
+        </p:style>
+        <p:txBody>
+          <a:bodyPr rtlCol="0" anchor="t"/>
+          <a:lstStyle/>
+          <a:p>
+            <a:r>
+              <a:rPr lang="en-US" sz="1600" dirty="0" smtClean="0">
+                <a:solidFill>
+                  <a:srgbClr val="000000"/>
+                </a:solidFill>
+              </a:rPr>
+              <a:t>Class: </a:t>
+            </a:r>
+            <a:r>
+              <a:rPr lang="en-US" sz="1600" dirty="0" err="1" smtClean="0">
+                <a:solidFill>
+                  <a:srgbClr val="000000"/>
+                </a:solidFill>
+              </a:rPr>
+              <a:t>kbbSystem</a:t>
+            </a:r>
+            <a:endParaRPr lang="en-US" sz="1600" dirty="0">
+              <a:solidFill>
+                <a:srgbClr val="000000"/>
+              </a:solidFill>
+            </a:endParaRPr>
+          </a:p>
+        </p:txBody>
+      </p:sp>
+      <p:sp>
+        <p:nvSpPr>
+          <p:cNvPr id="9" name="Rectangle 8"/>
+          <p:cNvSpPr/>
+          <p:nvPr/>
+        </p:nvSpPr>
+        <p:spPr>
+          <a:xfrm>
+            <a:off x="308703" y="3698947"/>
+            <a:ext cx="3656792" cy="2588038"/>
+          </a:xfrm>
+          <a:prstGeom prst="rect">
+            <a:avLst/>
+          </a:prstGeom>
+        </p:spPr>
+        <p:style>
+          <a:lnRef idx="1">
+            <a:schemeClr val="accent1"/>
+          </a:lnRef>
+          <a:fillRef idx="3">
+            <a:schemeClr val="accent1"/>
+          </a:fillRef>
+          <a:effectRef idx="2">
+            <a:schemeClr val="accent1"/>
+          </a:effectRef>
+          <a:fontRef idx="minor">
+            <a:schemeClr val="lt1"/>
+          </a:fontRef>
+        </p:style>
+        <p:txBody>
+          <a:bodyPr rtlCol="0" anchor="t"/>
+          <a:lstStyle/>
+          <a:p>
+            <a:r>
+              <a:rPr lang="en-US" sz="1600" dirty="0" smtClean="0">
+                <a:solidFill>
+                  <a:srgbClr val="000000"/>
+                </a:solidFill>
+              </a:rPr>
+              <a:t>Abstract Class: Product </a:t>
+            </a:r>
+            <a:endParaRPr lang="en-US" sz="1600" dirty="0">
+              <a:solidFill>
+                <a:srgbClr val="000000"/>
+              </a:solidFill>
+            </a:endParaRPr>
+          </a:p>
+        </p:txBody>
+      </p:sp>
+      <p:pic>
+        <p:nvPicPr>
+          <p:cNvPr id="8" name="Picture 7"/>
+          <p:cNvPicPr>
+            <a:picLocks noChangeAspect="1"/>
+          </p:cNvPicPr>
+          <p:nvPr/>
+        </p:nvPicPr>
+        <p:blipFill>
+          <a:blip r:embed="rId3"/>
+          <a:stretch>
+            <a:fillRect/>
+          </a:stretch>
+        </p:blipFill>
+        <p:spPr>
+          <a:xfrm>
+            <a:off x="487804" y="4660495"/>
+            <a:ext cx="2616200" cy="939800"/>
+          </a:xfrm>
+          <a:prstGeom prst="rect">
+            <a:avLst/>
+          </a:prstGeom>
+        </p:spPr>
+      </p:pic>
+      <p:sp>
+        <p:nvSpPr>
+          <p:cNvPr id="10" name="Rectangle 9"/>
+          <p:cNvSpPr/>
+          <p:nvPr/>
+        </p:nvSpPr>
+        <p:spPr>
+          <a:xfrm>
+            <a:off x="4630264" y="3698947"/>
+            <a:ext cx="3656792" cy="2588038"/>
+          </a:xfrm>
+          <a:prstGeom prst="rect">
+            <a:avLst/>
+          </a:prstGeom>
+        </p:spPr>
+        <p:style>
+          <a:lnRef idx="1">
+            <a:schemeClr val="accent1"/>
+          </a:lnRef>
+          <a:fillRef idx="3">
+            <a:schemeClr val="accent1"/>
+          </a:fillRef>
+          <a:effectRef idx="2">
+            <a:schemeClr val="accent1"/>
+          </a:effectRef>
+          <a:fontRef idx="minor">
+            <a:schemeClr val="lt1"/>
+          </a:fontRef>
+        </p:style>
+        <p:txBody>
+          <a:bodyPr rtlCol="0" anchor="t"/>
+          <a:lstStyle/>
+          <a:p>
+            <a:r>
+              <a:rPr lang="en-US" sz="1600" dirty="0" smtClean="0">
+                <a:solidFill>
+                  <a:srgbClr val="000000"/>
+                </a:solidFill>
+              </a:rPr>
+              <a:t>Interface: </a:t>
+            </a:r>
+            <a:endParaRPr lang="en-US" sz="1600" dirty="0">
+              <a:solidFill>
+                <a:srgbClr val="000000"/>
+              </a:solidFill>
+            </a:endParaRPr>
+          </a:p>
+        </p:txBody>
+      </p:sp>
+      <p:pic>
+        <p:nvPicPr>
+          <p:cNvPr id="12" name="Picture 11"/>
+          <p:cNvPicPr>
+            <a:picLocks noChangeAspect="1"/>
+          </p:cNvPicPr>
+          <p:nvPr/>
+        </p:nvPicPr>
+        <p:blipFill>
+          <a:blip r:embed="rId4"/>
+          <a:stretch>
+            <a:fillRect/>
+          </a:stretch>
+        </p:blipFill>
+        <p:spPr>
+          <a:xfrm>
+            <a:off x="4117895" y="1014020"/>
+            <a:ext cx="4864100" cy="1917700"/>
+          </a:xfrm>
+          <a:prstGeom prst="rect">
+            <a:avLst/>
+          </a:prstGeom>
+        </p:spPr>
+      </p:pic>
+      <p:pic>
+        <p:nvPicPr>
+          <p:cNvPr id="13" name="Picture 12"/>
+          <p:cNvPicPr>
+            <a:picLocks noChangeAspect="1"/>
+          </p:cNvPicPr>
+          <p:nvPr/>
+        </p:nvPicPr>
+        <p:blipFill>
+          <a:blip r:embed="rId5"/>
+          <a:stretch>
+            <a:fillRect/>
+          </a:stretch>
+        </p:blipFill>
+        <p:spPr>
+          <a:xfrm>
+            <a:off x="5479997" y="4001063"/>
+            <a:ext cx="2702567" cy="2285921"/>
+          </a:xfrm>
+          <a:prstGeom prst="rect">
+            <a:avLst/>
+          </a:prstGeom>
+        </p:spPr>
+      </p:pic>
+    </p:spTree>
+    <p:extLst>
+      <p:ext uri="{BB962C8B-B14F-4D97-AF65-F5344CB8AC3E}">
+        <p14:creationId xmlns:p14="http://schemas.microsoft.com/office/powerpoint/2010/main" val="2622739949"/>
+      </p:ext>
+    </p:extLst>
+  </p:cSld>
+  <p:clrMapOvr>
+    <a:masterClrMapping/>
+  </p:clrMapOvr>
+</p:sld>
+</file>
+
+<file path=ppt/slides/slide5.xml><?xml version="1.0" encoding="utf-8"?>
+<p:sld xmlns:a="http://schemas.openxmlformats.org/drawingml/2006/main" xmlns:r="http://schemas.openxmlformats.org/officeDocument/2006/relationships" xmlns:p="http://schemas.openxmlformats.org/presentationml/2006/main">
+  <p:cSld>
+    <p:spTree>
+      <p:nvGrpSpPr>
+        <p:cNvPr id="1" name=""/>
+        <p:cNvGrpSpPr/>
+        <p:nvPr/>
+      </p:nvGrpSpPr>
+      <p:grpSpPr>
+        <a:xfrm>
+          <a:off x="0" y="0"/>
+          <a:ext cx="0" cy="0"/>
+          <a:chOff x="0" y="0"/>
+          <a:chExt cx="0" cy="0"/>
+        </a:xfrm>
+      </p:grpSpPr>
+      <p:sp>
+        <p:nvSpPr>
+          <p:cNvPr id="4" name="Rectangle 3"/>
+          <p:cNvSpPr/>
+          <p:nvPr/>
+        </p:nvSpPr>
+        <p:spPr>
+          <a:xfrm>
+            <a:off x="308703" y="503207"/>
+            <a:ext cx="3369264" cy="3390832"/>
+          </a:xfrm>
+          <a:prstGeom prst="rect">
+            <a:avLst/>
+          </a:prstGeom>
+        </p:spPr>
+        <p:style>
+          <a:lnRef idx="1">
+            <a:schemeClr val="accent1"/>
+          </a:lnRef>
+          <a:fillRef idx="3">
+            <a:schemeClr val="accent1"/>
+          </a:fillRef>
+          <a:effectRef idx="2">
+            <a:schemeClr val="accent1"/>
+          </a:effectRef>
+          <a:fontRef idx="minor">
+            <a:schemeClr val="lt1"/>
+          </a:fontRef>
+        </p:style>
+        <p:txBody>
+          <a:bodyPr rtlCol="0" anchor="t"/>
+          <a:lstStyle/>
+          <a:p>
+            <a:r>
+              <a:rPr lang="en-US" sz="1600" dirty="0" smtClean="0">
+                <a:solidFill>
+                  <a:srgbClr val="000000"/>
+                </a:solidFill>
+              </a:rPr>
+              <a:t>Exception Handler</a:t>
+            </a:r>
+            <a:endParaRPr lang="en-US" sz="1600" dirty="0">
+              <a:solidFill>
+                <a:srgbClr val="000000"/>
+              </a:solidFill>
+            </a:endParaRPr>
+          </a:p>
+        </p:txBody>
+      </p:sp>
+      <p:pic>
+        <p:nvPicPr>
+          <p:cNvPr id="5" name="Picture 4"/>
+          <p:cNvPicPr>
+            <a:picLocks noChangeAspect="1"/>
+          </p:cNvPicPr>
+          <p:nvPr/>
+        </p:nvPicPr>
+        <p:blipFill>
+          <a:blip r:embed="rId2"/>
+          <a:stretch>
+            <a:fillRect/>
+          </a:stretch>
+        </p:blipFill>
+        <p:spPr>
+          <a:xfrm>
+            <a:off x="636140" y="971550"/>
+            <a:ext cx="2324100" cy="2451100"/>
+          </a:xfrm>
+          <a:prstGeom prst="rect">
+            <a:avLst/>
+          </a:prstGeom>
+        </p:spPr>
+      </p:pic>
+    </p:spTree>
+    <p:extLst>
+      <p:ext uri="{BB962C8B-B14F-4D97-AF65-F5344CB8AC3E}">
+        <p14:creationId xmlns:p14="http://schemas.microsoft.com/office/powerpoint/2010/main" val="2952579130"/>
+      </p:ext>
+    </p:extLst>
+  </p:cSld>
+  <p:clrMapOvr>
+    <a:masterClrMapping/>
+  </p:clrMapOvr>
+</p:sld>
+</file>
+
+<file path=ppt/slides/slide6.xml><?xml version="1.0" encoding="utf-8"?>
+<p:sld xmlns:a="http://schemas.openxmlformats.org/drawingml/2006/main" xmlns:r="http://schemas.openxmlformats.org/officeDocument/2006/relationships" xmlns:p="http://schemas.openxmlformats.org/presentationml/2006/main">
+  <p:cSld>
+    <p:spTree>
+      <p:nvGrpSpPr>
+        <p:cNvPr id="1" name=""/>
+        <p:cNvGrpSpPr/>
+        <p:nvPr/>
+      </p:nvGrpSpPr>
+      <p:grpSpPr>
+        <a:xfrm>
+          <a:off x="0" y="0"/>
+          <a:ext cx="0" cy="0"/>
+          <a:chOff x="0" y="0"/>
+          <a:chExt cx="0" cy="0"/>
+        </a:xfrm>
+      </p:grpSpPr>
+      <p:sp>
+        <p:nvSpPr>
+          <p:cNvPr id="3" name="Content Placeholder 2"/>
+          <p:cNvSpPr>
+            <a:spLocks noGrp="1"/>
+          </p:cNvSpPr>
+          <p:nvPr>
+            <p:ph idx="1"/>
+          </p:nvPr>
+        </p:nvSpPr>
+        <p:spPr>
+          <a:xfrm>
+            <a:off x="457200" y="347468"/>
+            <a:ext cx="8229600" cy="5778695"/>
+          </a:xfrm>
+        </p:spPr>
+        <p:txBody>
+          <a:bodyPr>
+            <a:normAutofit/>
+          </a:bodyPr>
+          <a:lstStyle/>
+          <a:p>
+            <a:pPr marL="0" indent="0">
+              <a:buNone/>
+            </a:pPr>
+            <a:r>
+              <a:rPr lang="en-US" sz="2000" dirty="0" smtClean="0"/>
+              <a:t>The text file uses &lt;&gt; and &lt;/&gt; to separate </a:t>
+            </a:r>
+            <a:r>
+              <a:rPr lang="en-US" sz="2000" dirty="0" err="1" smtClean="0"/>
+              <a:t>OptionSet</a:t>
+            </a:r>
+            <a:r>
+              <a:rPr lang="en-US" sz="2000" dirty="0" smtClean="0"/>
+              <a:t> names, uses comma to separate option names and prices. </a:t>
+            </a:r>
+          </a:p>
+          <a:p>
+            <a:pPr marL="0" indent="0">
+              <a:buNone/>
+            </a:pPr>
+            <a:r>
+              <a:rPr lang="en-US" sz="2000" dirty="0" smtClean="0"/>
+              <a:t>The program parse the file and construct an Automobile object, serialize and </a:t>
+            </a:r>
+            <a:r>
+              <a:rPr lang="en-US" sz="2000" dirty="0" err="1" smtClean="0"/>
+              <a:t>deserialize</a:t>
+            </a:r>
+            <a:r>
+              <a:rPr lang="en-US" sz="2000" dirty="0" smtClean="0"/>
+              <a:t> the data to recreate Automobile object. </a:t>
+            </a:r>
+          </a:p>
+          <a:p>
+            <a:pPr marL="0" indent="0">
+              <a:buNone/>
+            </a:pPr>
+            <a:endParaRPr lang="en-US" sz="2000" dirty="0" smtClean="0"/>
+          </a:p>
+          <a:p>
+            <a:pPr marL="0" indent="0">
+              <a:buNone/>
+            </a:pPr>
+            <a:r>
+              <a:rPr lang="en-US" sz="2000" dirty="0" smtClean="0"/>
+              <a:t>Program is implemented to accept  extra space at beginning or ending of each line or invalid price (e.g. No price or negative price). Duplicated option will be overwritten by the latest record. Duplicated </a:t>
+            </a:r>
+            <a:r>
+              <a:rPr lang="en-US" sz="2000" dirty="0" err="1" smtClean="0"/>
+              <a:t>OptionSet</a:t>
+            </a:r>
+            <a:r>
+              <a:rPr lang="en-US" sz="2000" dirty="0" smtClean="0"/>
+              <a:t> will be merged into one </a:t>
+            </a:r>
+            <a:r>
+              <a:rPr lang="en-US" sz="2000" dirty="0" err="1" smtClean="0"/>
+              <a:t>OptionSet</a:t>
+            </a:r>
+            <a:r>
+              <a:rPr lang="en-US" sz="2000" dirty="0" smtClean="0"/>
+              <a:t>.</a:t>
+            </a:r>
+          </a:p>
+          <a:p>
+            <a:pPr marL="0" indent="0">
+              <a:buNone/>
+            </a:pPr>
+            <a:endParaRPr lang="en-US" sz="2000" dirty="0"/>
+          </a:p>
+          <a:p>
+            <a:pPr marL="0" indent="0">
+              <a:buNone/>
+            </a:pPr>
+            <a:r>
+              <a:rPr lang="en-US" sz="2000" dirty="0" smtClean="0"/>
+              <a:t>To run the program, the user need to type in a certain format in </a:t>
+            </a:r>
+            <a:r>
+              <a:rPr lang="en-US" sz="2000" dirty="0" err="1" smtClean="0"/>
+              <a:t>car.in</a:t>
+            </a:r>
+            <a:r>
+              <a:rPr lang="en-US" sz="2000" dirty="0" smtClean="0"/>
+              <a:t> and get result from </a:t>
+            </a:r>
+            <a:r>
+              <a:rPr lang="en-US" sz="2000" dirty="0" err="1" smtClean="0"/>
+              <a:t>car.out</a:t>
+            </a:r>
+            <a:r>
+              <a:rPr lang="en-US" sz="2000" dirty="0" smtClean="0"/>
+              <a:t>.</a:t>
+            </a:r>
+          </a:p>
+          <a:p>
+            <a:pPr marL="0" indent="0">
+              <a:buNone/>
+            </a:pPr>
+            <a:endParaRPr lang="en-US" sz="2000" dirty="0" smtClean="0"/>
+          </a:p>
+          <a:p>
+            <a:pPr marL="0" indent="0">
+              <a:buNone/>
+            </a:pPr>
+            <a:endParaRPr lang="en-US" sz="2000" dirty="0"/>
+          </a:p>
+        </p:txBody>
+      </p:sp>
+    </p:spTree>
+    <p:extLst>
+      <p:ext uri="{BB962C8B-B14F-4D97-AF65-F5344CB8AC3E}">
+        <p14:creationId xmlns:p14="http://schemas.microsoft.com/office/powerpoint/2010/main" val="3170999999"/>
       </p:ext>
     </p:extLst>
   </p:cSld>

</xml_diff>